<commit_message>
added more content to tutorial 1
</commit_message>
<xml_diff>
--- a/01-githubTutorial1.pptx
+++ b/01-githubTutorial1.pptx
@@ -2,39 +2,42 @@
 <file path=ppt/presentation.xml><?xml version="1.0" encoding="utf-8"?>
 <p:presentation xmlns:a="http://schemas.openxmlformats.org/drawingml/2006/main" xmlns:r="http://schemas.openxmlformats.org/officeDocument/2006/relationships" xmlns:p="http://schemas.openxmlformats.org/presentationml/2006/main" saveSubsetFonts="1">
   <p:sldMasterIdLst>
-    <p:sldMasterId id="2147483864" r:id="rId1"/>
+    <p:sldMasterId id="2147483994" r:id="rId1"/>
   </p:sldMasterIdLst>
   <p:notesMasterIdLst>
-    <p:notesMasterId r:id="rId29"/>
+    <p:notesMasterId r:id="rId32"/>
   </p:notesMasterIdLst>
   <p:sldIdLst>
     <p:sldId id="256" r:id="rId2"/>
-    <p:sldId id="257" r:id="rId3"/>
-    <p:sldId id="264" r:id="rId4"/>
-    <p:sldId id="258" r:id="rId5"/>
-    <p:sldId id="259" r:id="rId6"/>
-    <p:sldId id="260" r:id="rId7"/>
-    <p:sldId id="262" r:id="rId8"/>
-    <p:sldId id="273" r:id="rId9"/>
-    <p:sldId id="274" r:id="rId10"/>
-    <p:sldId id="270" r:id="rId11"/>
-    <p:sldId id="265" r:id="rId12"/>
-    <p:sldId id="266" r:id="rId13"/>
-    <p:sldId id="263" r:id="rId14"/>
-    <p:sldId id="271" r:id="rId15"/>
-    <p:sldId id="275" r:id="rId16"/>
-    <p:sldId id="277" r:id="rId17"/>
-    <p:sldId id="281" r:id="rId18"/>
-    <p:sldId id="282" r:id="rId19"/>
-    <p:sldId id="283" r:id="rId20"/>
-    <p:sldId id="284" r:id="rId21"/>
-    <p:sldId id="276" r:id="rId22"/>
-    <p:sldId id="285" r:id="rId23"/>
-    <p:sldId id="286" r:id="rId24"/>
-    <p:sldId id="278" r:id="rId25"/>
-    <p:sldId id="279" r:id="rId26"/>
-    <p:sldId id="280" r:id="rId27"/>
-    <p:sldId id="261" r:id="rId28"/>
+    <p:sldId id="288" r:id="rId3"/>
+    <p:sldId id="257" r:id="rId4"/>
+    <p:sldId id="264" r:id="rId5"/>
+    <p:sldId id="258" r:id="rId6"/>
+    <p:sldId id="259" r:id="rId7"/>
+    <p:sldId id="260" r:id="rId8"/>
+    <p:sldId id="289" r:id="rId9"/>
+    <p:sldId id="273" r:id="rId10"/>
+    <p:sldId id="274" r:id="rId11"/>
+    <p:sldId id="270" r:id="rId12"/>
+    <p:sldId id="265" r:id="rId13"/>
+    <p:sldId id="266" r:id="rId14"/>
+    <p:sldId id="263" r:id="rId15"/>
+    <p:sldId id="271" r:id="rId16"/>
+    <p:sldId id="275" r:id="rId17"/>
+    <p:sldId id="277" r:id="rId18"/>
+    <p:sldId id="281" r:id="rId19"/>
+    <p:sldId id="282" r:id="rId20"/>
+    <p:sldId id="283" r:id="rId21"/>
+    <p:sldId id="284" r:id="rId22"/>
+    <p:sldId id="276" r:id="rId23"/>
+    <p:sldId id="285" r:id="rId24"/>
+    <p:sldId id="286" r:id="rId25"/>
+    <p:sldId id="290" r:id="rId26"/>
+    <p:sldId id="278" r:id="rId27"/>
+    <p:sldId id="279" r:id="rId28"/>
+    <p:sldId id="280" r:id="rId29"/>
+    <p:sldId id="291" r:id="rId30"/>
+    <p:sldId id="261" r:id="rId31"/>
   </p:sldIdLst>
   <p:sldSz cx="12192000" cy="6858000"/>
   <p:notesSz cx="6858000" cy="9144000"/>
@@ -896,17 +899,17 @@
       <dgm:spPr/>
     </dgm:pt>
     <dgm:pt modelId="{9595A661-6E48-4B53-A3AD-2035998D0C59}">
-      <dgm:prSet phldrT="[Text]"/>
+      <dgm:prSet phldrT="[Text]" custT="1"/>
       <dgm:spPr/>
       <dgm:t>
         <a:bodyPr/>
         <a:lstStyle/>
         <a:p>
           <a:r>
-            <a:rPr lang="en-CA" dirty="0" smtClean="0"/>
+            <a:rPr lang="en-CA" sz="2000" dirty="0" smtClean="0"/>
             <a:t>http://git-scm.com/download/win</a:t>
           </a:r>
-          <a:endParaRPr lang="en-CA" dirty="0"/>
+          <a:endParaRPr lang="en-CA" sz="2000" dirty="0"/>
         </a:p>
       </dgm:t>
     </dgm:pt>
@@ -933,17 +936,17 @@
       </dgm:t>
     </dgm:pt>
     <dgm:pt modelId="{ED3731F8-1FF2-4427-AD8F-8C412113DFD0}">
-      <dgm:prSet phldrT="[Text]"/>
+      <dgm:prSet phldrT="[Text]" custT="1"/>
       <dgm:spPr/>
       <dgm:t>
         <a:bodyPr/>
         <a:lstStyle/>
         <a:p>
           <a:r>
-            <a:rPr lang="en-CA" dirty="0" smtClean="0"/>
+            <a:rPr lang="en-CA" sz="2000" dirty="0" smtClean="0"/>
             <a:t>http://git-scm.com/download/mac</a:t>
           </a:r>
-          <a:endParaRPr lang="en-CA" dirty="0"/>
+          <a:endParaRPr lang="en-CA" sz="2000" dirty="0"/>
         </a:p>
       </dgm:t>
     </dgm:pt>
@@ -970,21 +973,21 @@
       </dgm:t>
     </dgm:pt>
     <dgm:pt modelId="{E55F2C17-88F3-4B50-AC2B-B8F6D82D0469}">
-      <dgm:prSet phldrT="[Text]"/>
+      <dgm:prSet phldrT="[Text]" custT="1"/>
       <dgm:spPr/>
       <dgm:t>
         <a:bodyPr/>
         <a:lstStyle/>
         <a:p>
           <a:r>
-            <a:rPr lang="en-CA" dirty="0" err="1" smtClean="0"/>
+            <a:rPr lang="en-CA" sz="2000" dirty="0" err="1" smtClean="0"/>
             <a:t>sudo</a:t>
           </a:r>
           <a:r>
-            <a:rPr lang="en-CA" dirty="0" smtClean="0"/>
+            <a:rPr lang="en-CA" sz="2000" dirty="0" smtClean="0"/>
             <a:t> apt-get install git</a:t>
           </a:r>
-          <a:endParaRPr lang="en-CA" dirty="0"/>
+          <a:endParaRPr lang="en-CA" sz="2000" dirty="0"/>
         </a:p>
       </dgm:t>
     </dgm:pt>
@@ -1221,6 +1224,465 @@
       <dsp:cNvGrpSpPr/>
     </dsp:nvGrpSpPr>
     <dsp:grpSpPr/>
+    <dsp:sp modelId="{1DB5C47C-AECA-4340-B71E-96D6066ECB03}">
+      <dsp:nvSpPr>
+        <dsp:cNvPr id="0" name=""/>
+        <dsp:cNvSpPr/>
+      </dsp:nvSpPr>
+      <dsp:spPr>
+        <a:xfrm>
+          <a:off x="0" y="0"/>
+          <a:ext cx="6731000" cy="1958102"/>
+        </a:xfrm>
+        <a:prstGeom prst="roundRect">
+          <a:avLst>
+            <a:gd name="adj" fmla="val 10000"/>
+          </a:avLst>
+        </a:prstGeom>
+        <a:solidFill>
+          <a:schemeClr val="accent1">
+            <a:alpha val="90000"/>
+            <a:tint val="40000"/>
+            <a:hueOff val="0"/>
+            <a:satOff val="0"/>
+            <a:lumOff val="0"/>
+            <a:alphaOff val="0"/>
+          </a:schemeClr>
+        </a:solidFill>
+        <a:ln w="12700" cap="flat" cmpd="sng" algn="ctr">
+          <a:solidFill>
+            <a:schemeClr val="accent1">
+              <a:alpha val="90000"/>
+              <a:tint val="40000"/>
+              <a:hueOff val="0"/>
+              <a:satOff val="0"/>
+              <a:lumOff val="0"/>
+              <a:alphaOff val="0"/>
+            </a:schemeClr>
+          </a:solidFill>
+          <a:prstDash val="solid"/>
+          <a:miter lim="800000"/>
+        </a:ln>
+        <a:effectLst/>
+      </dsp:spPr>
+      <dsp:style>
+        <a:lnRef idx="2">
+          <a:scrgbClr r="0" g="0" b="0"/>
+        </a:lnRef>
+        <a:fillRef idx="1">
+          <a:scrgbClr r="0" g="0" b="0"/>
+        </a:fillRef>
+        <a:effectRef idx="0">
+          <a:scrgbClr r="0" g="0" b="0"/>
+        </a:effectRef>
+        <a:fontRef idx="minor"/>
+      </dsp:style>
+    </dsp:sp>
+    <dsp:sp modelId="{D34F1DEE-0B5F-4829-8C07-EEB5EAEB8462}">
+      <dsp:nvSpPr>
+        <dsp:cNvPr id="0" name=""/>
+        <dsp:cNvSpPr/>
+      </dsp:nvSpPr>
+      <dsp:spPr>
+        <a:xfrm>
+          <a:off x="201930" y="261080"/>
+          <a:ext cx="1977231" cy="1435941"/>
+        </a:xfrm>
+        <a:prstGeom prst="roundRect">
+          <a:avLst>
+            <a:gd name="adj" fmla="val 10000"/>
+          </a:avLst>
+        </a:prstGeom>
+        <a:blipFill>
+          <a:blip xmlns:r="http://schemas.openxmlformats.org/officeDocument/2006/relationships" r:embed="rId1">
+            <a:extLst>
+              <a:ext uri="{28A0092B-C50C-407E-A947-70E740481C1C}">
+                <a14:useLocalDpi xmlns:a14="http://schemas.microsoft.com/office/drawing/2010/main" val="0"/>
+              </a:ext>
+            </a:extLst>
+          </a:blip>
+          <a:srcRect/>
+          <a:stretch>
+            <a:fillRect t="-6000" b="-6000"/>
+          </a:stretch>
+        </a:blipFill>
+        <a:ln w="12700" cap="flat" cmpd="sng" algn="ctr">
+          <a:solidFill>
+            <a:schemeClr val="lt1">
+              <a:hueOff val="0"/>
+              <a:satOff val="0"/>
+              <a:lumOff val="0"/>
+              <a:alphaOff val="0"/>
+            </a:schemeClr>
+          </a:solidFill>
+          <a:prstDash val="solid"/>
+          <a:miter lim="800000"/>
+        </a:ln>
+        <a:effectLst/>
+      </dsp:spPr>
+      <dsp:style>
+        <a:lnRef idx="2">
+          <a:scrgbClr r="0" g="0" b="0"/>
+        </a:lnRef>
+        <a:fillRef idx="1">
+          <a:scrgbClr r="0" g="0" b="0"/>
+        </a:fillRef>
+        <a:effectRef idx="0">
+          <a:scrgbClr r="0" g="0" b="0"/>
+        </a:effectRef>
+        <a:fontRef idx="minor"/>
+      </dsp:style>
+    </dsp:sp>
+    <dsp:sp modelId="{7CFB9D61-3C8B-49A7-A24E-256E2BC8DCDA}">
+      <dsp:nvSpPr>
+        <dsp:cNvPr id="0" name=""/>
+        <dsp:cNvSpPr/>
+      </dsp:nvSpPr>
+      <dsp:spPr>
+        <a:xfrm rot="10800000">
+          <a:off x="201930" y="1958102"/>
+          <a:ext cx="1977231" cy="2393235"/>
+        </a:xfrm>
+        <a:prstGeom prst="round2SameRect">
+          <a:avLst>
+            <a:gd name="adj1" fmla="val 10500"/>
+            <a:gd name="adj2" fmla="val 0"/>
+          </a:avLst>
+        </a:prstGeom>
+        <a:solidFill>
+          <a:schemeClr val="accent1">
+            <a:hueOff val="0"/>
+            <a:satOff val="0"/>
+            <a:lumOff val="0"/>
+            <a:alphaOff val="0"/>
+          </a:schemeClr>
+        </a:solidFill>
+        <a:ln w="12700" cap="flat" cmpd="sng" algn="ctr">
+          <a:solidFill>
+            <a:schemeClr val="lt1">
+              <a:hueOff val="0"/>
+              <a:satOff val="0"/>
+              <a:lumOff val="0"/>
+              <a:alphaOff val="0"/>
+            </a:schemeClr>
+          </a:solidFill>
+          <a:prstDash val="solid"/>
+          <a:miter lim="800000"/>
+        </a:ln>
+        <a:effectLst/>
+      </dsp:spPr>
+      <dsp:style>
+        <a:lnRef idx="2">
+          <a:scrgbClr r="0" g="0" b="0"/>
+        </a:lnRef>
+        <a:fillRef idx="1">
+          <a:scrgbClr r="0" g="0" b="0"/>
+        </a:fillRef>
+        <a:effectRef idx="0">
+          <a:scrgbClr r="0" g="0" b="0"/>
+        </a:effectRef>
+        <a:fontRef idx="minor">
+          <a:schemeClr val="lt1"/>
+        </a:fontRef>
+      </dsp:style>
+      <dsp:txBody>
+        <a:bodyPr spcFirstLastPara="0" vert="horz" wrap="square" lIns="142240" tIns="142240" rIns="142240" bIns="142240" numCol="1" spcCol="1270" anchor="t" anchorCtr="0">
+          <a:noAutofit/>
+        </a:bodyPr>
+        <a:lstStyle/>
+        <a:p>
+          <a:pPr lvl="0" algn="ctr" defTabSz="889000">
+            <a:lnSpc>
+              <a:spcPct val="90000"/>
+            </a:lnSpc>
+            <a:spcBef>
+              <a:spcPct val="0"/>
+            </a:spcBef>
+            <a:spcAft>
+              <a:spcPct val="35000"/>
+            </a:spcAft>
+          </a:pPr>
+          <a:r>
+            <a:rPr lang="en-CA" sz="2000" kern="1200" dirty="0" smtClean="0"/>
+            <a:t>http://git-scm.com/download/win</a:t>
+          </a:r>
+          <a:endParaRPr lang="en-CA" sz="2000" kern="1200" dirty="0"/>
+        </a:p>
+      </dsp:txBody>
+      <dsp:txXfrm rot="10800000">
+        <a:off x="262737" y="1958102"/>
+        <a:ext cx="1855617" cy="2332428"/>
+      </dsp:txXfrm>
+    </dsp:sp>
+    <dsp:sp modelId="{5CC3E3C4-B067-4926-9114-D6439DB76881}">
+      <dsp:nvSpPr>
+        <dsp:cNvPr id="0" name=""/>
+        <dsp:cNvSpPr/>
+      </dsp:nvSpPr>
+      <dsp:spPr>
+        <a:xfrm>
+          <a:off x="2376884" y="261080"/>
+          <a:ext cx="1977231" cy="1435941"/>
+        </a:xfrm>
+        <a:prstGeom prst="roundRect">
+          <a:avLst>
+            <a:gd name="adj" fmla="val 10000"/>
+          </a:avLst>
+        </a:prstGeom>
+        <a:blipFill>
+          <a:blip xmlns:r="http://schemas.openxmlformats.org/officeDocument/2006/relationships" r:embed="rId2">
+            <a:extLst>
+              <a:ext uri="{28A0092B-C50C-407E-A947-70E740481C1C}">
+                <a14:useLocalDpi xmlns:a14="http://schemas.microsoft.com/office/drawing/2010/main" val="0"/>
+              </a:ext>
+            </a:extLst>
+          </a:blip>
+          <a:srcRect/>
+          <a:stretch>
+            <a:fillRect t="-14000" b="-14000"/>
+          </a:stretch>
+        </a:blipFill>
+        <a:ln w="12700" cap="flat" cmpd="sng" algn="ctr">
+          <a:noFill/>
+          <a:prstDash val="solid"/>
+          <a:miter lim="800000"/>
+        </a:ln>
+        <a:effectLst/>
+      </dsp:spPr>
+      <dsp:style>
+        <a:lnRef idx="2">
+          <a:scrgbClr r="0" g="0" b="0"/>
+        </a:lnRef>
+        <a:fillRef idx="1">
+          <a:scrgbClr r="0" g="0" b="0"/>
+        </a:fillRef>
+        <a:effectRef idx="0">
+          <a:scrgbClr r="0" g="0" b="0"/>
+        </a:effectRef>
+        <a:fontRef idx="minor"/>
+      </dsp:style>
+    </dsp:sp>
+    <dsp:sp modelId="{EC84E066-D488-4352-855E-BB33EE85AA0A}">
+      <dsp:nvSpPr>
+        <dsp:cNvPr id="0" name=""/>
+        <dsp:cNvSpPr/>
+      </dsp:nvSpPr>
+      <dsp:spPr>
+        <a:xfrm rot="10800000">
+          <a:off x="2376884" y="1958102"/>
+          <a:ext cx="1977231" cy="2393235"/>
+        </a:xfrm>
+        <a:prstGeom prst="round2SameRect">
+          <a:avLst>
+            <a:gd name="adj1" fmla="val 10500"/>
+            <a:gd name="adj2" fmla="val 0"/>
+          </a:avLst>
+        </a:prstGeom>
+        <a:solidFill>
+          <a:schemeClr val="accent1">
+            <a:hueOff val="0"/>
+            <a:satOff val="0"/>
+            <a:lumOff val="0"/>
+            <a:alphaOff val="0"/>
+          </a:schemeClr>
+        </a:solidFill>
+        <a:ln w="12700" cap="flat" cmpd="sng" algn="ctr">
+          <a:solidFill>
+            <a:schemeClr val="lt1">
+              <a:hueOff val="0"/>
+              <a:satOff val="0"/>
+              <a:lumOff val="0"/>
+              <a:alphaOff val="0"/>
+            </a:schemeClr>
+          </a:solidFill>
+          <a:prstDash val="solid"/>
+          <a:miter lim="800000"/>
+        </a:ln>
+        <a:effectLst/>
+      </dsp:spPr>
+      <dsp:style>
+        <a:lnRef idx="2">
+          <a:scrgbClr r="0" g="0" b="0"/>
+        </a:lnRef>
+        <a:fillRef idx="1">
+          <a:scrgbClr r="0" g="0" b="0"/>
+        </a:fillRef>
+        <a:effectRef idx="0">
+          <a:scrgbClr r="0" g="0" b="0"/>
+        </a:effectRef>
+        <a:fontRef idx="minor">
+          <a:schemeClr val="lt1"/>
+        </a:fontRef>
+      </dsp:style>
+      <dsp:txBody>
+        <a:bodyPr spcFirstLastPara="0" vert="horz" wrap="square" lIns="142240" tIns="142240" rIns="142240" bIns="142240" numCol="1" spcCol="1270" anchor="t" anchorCtr="0">
+          <a:noAutofit/>
+        </a:bodyPr>
+        <a:lstStyle/>
+        <a:p>
+          <a:pPr lvl="0" algn="ctr" defTabSz="889000">
+            <a:lnSpc>
+              <a:spcPct val="90000"/>
+            </a:lnSpc>
+            <a:spcBef>
+              <a:spcPct val="0"/>
+            </a:spcBef>
+            <a:spcAft>
+              <a:spcPct val="35000"/>
+            </a:spcAft>
+          </a:pPr>
+          <a:r>
+            <a:rPr lang="en-CA" sz="2000" kern="1200" dirty="0" smtClean="0"/>
+            <a:t>http://git-scm.com/download/mac</a:t>
+          </a:r>
+          <a:endParaRPr lang="en-CA" sz="2000" kern="1200" dirty="0"/>
+        </a:p>
+      </dsp:txBody>
+      <dsp:txXfrm rot="10800000">
+        <a:off x="2437691" y="1958102"/>
+        <a:ext cx="1855617" cy="2332428"/>
+      </dsp:txXfrm>
+    </dsp:sp>
+    <dsp:sp modelId="{83C04165-694E-4ACC-9C17-CAA19DFD4413}">
+      <dsp:nvSpPr>
+        <dsp:cNvPr id="0" name=""/>
+        <dsp:cNvSpPr/>
+      </dsp:nvSpPr>
+      <dsp:spPr>
+        <a:xfrm>
+          <a:off x="4551838" y="261080"/>
+          <a:ext cx="1977231" cy="1435941"/>
+        </a:xfrm>
+        <a:prstGeom prst="roundRect">
+          <a:avLst>
+            <a:gd name="adj" fmla="val 10000"/>
+          </a:avLst>
+        </a:prstGeom>
+        <a:blipFill>
+          <a:blip xmlns:r="http://schemas.openxmlformats.org/officeDocument/2006/relationships" r:embed="rId3">
+            <a:extLst>
+              <a:ext uri="{28A0092B-C50C-407E-A947-70E740481C1C}">
+                <a14:useLocalDpi xmlns:a14="http://schemas.microsoft.com/office/drawing/2010/main" val="0"/>
+              </a:ext>
+            </a:extLst>
+          </a:blip>
+          <a:srcRect/>
+          <a:stretch>
+            <a:fillRect l="-17000" r="-17000"/>
+          </a:stretch>
+        </a:blipFill>
+        <a:ln w="12700" cap="flat" cmpd="sng" algn="ctr">
+          <a:solidFill>
+            <a:schemeClr val="lt1">
+              <a:hueOff val="0"/>
+              <a:satOff val="0"/>
+              <a:lumOff val="0"/>
+              <a:alphaOff val="0"/>
+            </a:schemeClr>
+          </a:solidFill>
+          <a:prstDash val="solid"/>
+          <a:miter lim="800000"/>
+        </a:ln>
+        <a:effectLst/>
+      </dsp:spPr>
+      <dsp:style>
+        <a:lnRef idx="2">
+          <a:scrgbClr r="0" g="0" b="0"/>
+        </a:lnRef>
+        <a:fillRef idx="1">
+          <a:scrgbClr r="0" g="0" b="0"/>
+        </a:fillRef>
+        <a:effectRef idx="0">
+          <a:scrgbClr r="0" g="0" b="0"/>
+        </a:effectRef>
+        <a:fontRef idx="minor"/>
+      </dsp:style>
+    </dsp:sp>
+    <dsp:sp modelId="{834549AA-9EB6-4B36-8657-154342198D02}">
+      <dsp:nvSpPr>
+        <dsp:cNvPr id="0" name=""/>
+        <dsp:cNvSpPr/>
+      </dsp:nvSpPr>
+      <dsp:spPr>
+        <a:xfrm rot="10800000">
+          <a:off x="4551838" y="1958102"/>
+          <a:ext cx="1977231" cy="2393235"/>
+        </a:xfrm>
+        <a:prstGeom prst="round2SameRect">
+          <a:avLst>
+            <a:gd name="adj1" fmla="val 10500"/>
+            <a:gd name="adj2" fmla="val 0"/>
+          </a:avLst>
+        </a:prstGeom>
+        <a:solidFill>
+          <a:schemeClr val="accent1">
+            <a:hueOff val="0"/>
+            <a:satOff val="0"/>
+            <a:lumOff val="0"/>
+            <a:alphaOff val="0"/>
+          </a:schemeClr>
+        </a:solidFill>
+        <a:ln w="12700" cap="flat" cmpd="sng" algn="ctr">
+          <a:solidFill>
+            <a:schemeClr val="lt1">
+              <a:hueOff val="0"/>
+              <a:satOff val="0"/>
+              <a:lumOff val="0"/>
+              <a:alphaOff val="0"/>
+            </a:schemeClr>
+          </a:solidFill>
+          <a:prstDash val="solid"/>
+          <a:miter lim="800000"/>
+        </a:ln>
+        <a:effectLst/>
+      </dsp:spPr>
+      <dsp:style>
+        <a:lnRef idx="2">
+          <a:scrgbClr r="0" g="0" b="0"/>
+        </a:lnRef>
+        <a:fillRef idx="1">
+          <a:scrgbClr r="0" g="0" b="0"/>
+        </a:fillRef>
+        <a:effectRef idx="0">
+          <a:scrgbClr r="0" g="0" b="0"/>
+        </a:effectRef>
+        <a:fontRef idx="minor">
+          <a:schemeClr val="lt1"/>
+        </a:fontRef>
+      </dsp:style>
+      <dsp:txBody>
+        <a:bodyPr spcFirstLastPara="0" vert="horz" wrap="square" lIns="142240" tIns="142240" rIns="142240" bIns="142240" numCol="1" spcCol="1270" anchor="t" anchorCtr="0">
+          <a:noAutofit/>
+        </a:bodyPr>
+        <a:lstStyle/>
+        <a:p>
+          <a:pPr lvl="0" algn="ctr" defTabSz="889000">
+            <a:lnSpc>
+              <a:spcPct val="90000"/>
+            </a:lnSpc>
+            <a:spcBef>
+              <a:spcPct val="0"/>
+            </a:spcBef>
+            <a:spcAft>
+              <a:spcPct val="35000"/>
+            </a:spcAft>
+          </a:pPr>
+          <a:r>
+            <a:rPr lang="en-CA" sz="2000" kern="1200" dirty="0" err="1" smtClean="0"/>
+            <a:t>sudo</a:t>
+          </a:r>
+          <a:r>
+            <a:rPr lang="en-CA" sz="2000" kern="1200" dirty="0" smtClean="0"/>
+            <a:t> apt-get install git</a:t>
+          </a:r>
+          <a:endParaRPr lang="en-CA" sz="2000" kern="1200" dirty="0"/>
+        </a:p>
+      </dsp:txBody>
+      <dsp:txXfrm rot="10800000">
+        <a:off x="4612645" y="1958102"/>
+        <a:ext cx="1855617" cy="2332428"/>
+      </dsp:txXfrm>
+    </dsp:sp>
   </dsp:spTree>
 </dsp:drawing>
 </file>
@@ -2530,7 +2992,7 @@
           <a:p>
             <a:fld id="{EB03AF97-B4FF-4008-BA61-32AC40787ADA}" type="datetimeFigureOut">
               <a:rPr lang="en-US"/>
-              <a:t>9/5/2014</a:t>
+              <a:t>9/7/2014</a:t>
             </a:fld>
             <a:endParaRPr lang="en-US"/>
           </a:p>
@@ -2968,7 +3430,7 @@
           <a:p>
             <a:fld id="{266FFDD2-8F09-4B95-855D-B6E7196B1E6E}" type="slidenum">
               <a:rPr lang="en-US" smtClean="0"/>
-              <a:t>12</a:t>
+              <a:t>13</a:t>
             </a:fld>
             <a:endParaRPr lang="en-US"/>
           </a:p>
@@ -3098,7 +3560,7 @@
           <a:p>
             <a:fld id="{266FFDD2-8F09-4B95-855D-B6E7196B1E6E}" type="slidenum">
               <a:rPr lang="en-US" smtClean="0"/>
-              <a:t>13</a:t>
+              <a:t>14</a:t>
             </a:fld>
             <a:endParaRPr lang="en-US"/>
           </a:p>
@@ -3237,7 +3699,7 @@
           <a:p>
             <a:fld id="{266FFDD2-8F09-4B95-855D-B6E7196B1E6E}" type="slidenum">
               <a:rPr lang="en-US" smtClean="0"/>
-              <a:t>14</a:t>
+              <a:t>15</a:t>
             </a:fld>
             <a:endParaRPr lang="en-US"/>
           </a:p>
@@ -3350,7 +3812,7 @@
           <a:p>
             <a:fld id="{266FFDD2-8F09-4B95-855D-B6E7196B1E6E}" type="slidenum">
               <a:rPr lang="en-US" smtClean="0"/>
-              <a:t>15</a:t>
+              <a:t>16</a:t>
             </a:fld>
             <a:endParaRPr lang="en-US"/>
           </a:p>
@@ -3468,7 +3930,7 @@
           <a:p>
             <a:fld id="{266FFDD2-8F09-4B95-855D-B6E7196B1E6E}" type="slidenum">
               <a:rPr lang="en-US" smtClean="0"/>
-              <a:t>16</a:t>
+              <a:t>17</a:t>
             </a:fld>
             <a:endParaRPr lang="en-US"/>
           </a:p>
@@ -3595,7 +4057,7 @@
           <a:p>
             <a:fld id="{266FFDD2-8F09-4B95-855D-B6E7196B1E6E}" type="slidenum">
               <a:rPr lang="en-US" smtClean="0"/>
-              <a:t>17</a:t>
+              <a:t>18</a:t>
             </a:fld>
             <a:endParaRPr lang="en-US"/>
           </a:p>
@@ -3728,7 +4190,7 @@
           <a:p>
             <a:fld id="{266FFDD2-8F09-4B95-855D-B6E7196B1E6E}" type="slidenum">
               <a:rPr lang="en-US" smtClean="0"/>
-              <a:t>18</a:t>
+              <a:t>19</a:t>
             </a:fld>
             <a:endParaRPr lang="en-US"/>
           </a:p>
@@ -3839,7 +4301,7 @@
           <a:p>
             <a:fld id="{266FFDD2-8F09-4B95-855D-B6E7196B1E6E}" type="slidenum">
               <a:rPr lang="en-US" smtClean="0"/>
-              <a:t>19</a:t>
+              <a:t>20</a:t>
             </a:fld>
             <a:endParaRPr lang="en-US"/>
           </a:p>
@@ -3931,7 +4393,7 @@
           <a:p>
             <a:fld id="{266FFDD2-8F09-4B95-855D-B6E7196B1E6E}" type="slidenum">
               <a:rPr lang="en-US" smtClean="0"/>
-              <a:t>20</a:t>
+              <a:t>21</a:t>
             </a:fld>
             <a:endParaRPr lang="en-US"/>
           </a:p>
@@ -3996,11 +4458,7 @@
           <a:p>
             <a:r>
               <a:rPr lang="en-CA" dirty="0" smtClean="0"/>
-              <a:t>Check the logs to see who committed, what they committed, and </a:t>
-            </a:r>
-            <a:r>
-              <a:rPr lang="en-CA" dirty="0" smtClean="0"/>
-              <a:t>when with “git log”</a:t>
+              <a:t>Check the logs to see who committed, what they committed, and when with “git log”</a:t>
             </a:r>
             <a:endParaRPr lang="en-CA" dirty="0"/>
           </a:p>
@@ -4023,7 +4481,7 @@
           <a:p>
             <a:fld id="{266FFDD2-8F09-4B95-855D-B6E7196B1E6E}" type="slidenum">
               <a:rPr lang="en-US" smtClean="0"/>
-              <a:t>21</a:t>
+              <a:t>22</a:t>
             </a:fld>
             <a:endParaRPr lang="en-US"/>
           </a:p>
@@ -4107,7 +4565,7 @@
           <a:p>
             <a:fld id="{266FFDD2-8F09-4B95-855D-B6E7196B1E6E}" type="slidenum">
               <a:rPr lang="en-US"/>
-              <a:t>2</a:t>
+              <a:t>3</a:t>
             </a:fld>
             <a:endParaRPr lang="en-US"/>
           </a:p>
@@ -4266,7 +4724,7 @@
           <a:p>
             <a:fld id="{266FFDD2-8F09-4B95-855D-B6E7196B1E6E}" type="slidenum">
               <a:rPr lang="en-US" smtClean="0"/>
-              <a:t>22</a:t>
+              <a:t>23</a:t>
             </a:fld>
             <a:endParaRPr lang="en-US"/>
           </a:p>
@@ -4331,42 +4789,11 @@
           <a:p>
             <a:r>
               <a:rPr lang="en-CA" dirty="0" smtClean="0"/>
-              <a:t>We now need to sync</a:t>
+              <a:t>Git</a:t>
             </a:r>
             <a:r>
               <a:rPr lang="en-CA" baseline="0" dirty="0" smtClean="0"/>
-              <a:t> our work to the cloud.</a:t>
-            </a:r>
-          </a:p>
-          <a:p>
-            <a:endParaRPr lang="en-CA" baseline="0" dirty="0" smtClean="0"/>
-          </a:p>
-          <a:p>
-            <a:r>
-              <a:rPr lang="en-CA" baseline="0" dirty="0" smtClean="0"/>
-              <a:t>Start by</a:t>
-            </a:r>
-          </a:p>
-          <a:p>
-            <a:pPr marL="228600" indent="-228600">
-              <a:buAutoNum type="arabicPeriod"/>
-            </a:pPr>
-            <a:r>
-              <a:rPr lang="en-CA" baseline="0" dirty="0" smtClean="0"/>
-              <a:t>going to the link </a:t>
-            </a:r>
-          </a:p>
-          <a:p>
-            <a:pPr marL="228600" indent="-228600">
-              <a:buAutoNum type="arabicPeriod"/>
-            </a:pPr>
-            <a:r>
-              <a:rPr lang="en-CA" baseline="0" dirty="0" smtClean="0"/>
-              <a:t>and creating a new repository on </a:t>
-            </a:r>
-            <a:r>
-              <a:rPr lang="en-CA" baseline="0" dirty="0" err="1" smtClean="0"/>
-              <a:t>github</a:t>
+              <a:t> diff shows us changes in a file since the last commit. In this case I’ve deleted a semicolon</a:t>
             </a:r>
             <a:endParaRPr lang="en-CA" dirty="0"/>
           </a:p>
@@ -4398,7 +4825,7 @@
     </p:spTree>
     <p:extLst>
       <p:ext uri="{BB962C8B-B14F-4D97-AF65-F5344CB8AC3E}">
-        <p14:creationId xmlns:p14="http://schemas.microsoft.com/office/powerpoint/2010/main" val="3730388118"/>
+        <p14:creationId xmlns:p14="http://schemas.microsoft.com/office/powerpoint/2010/main" val="3501323353"/>
       </p:ext>
     </p:extLst>
   </p:cSld>
@@ -4454,23 +4881,11 @@
           <a:p>
             <a:r>
               <a:rPr lang="en-CA" dirty="0" smtClean="0"/>
-              <a:t>3. Copy</a:t>
+              <a:t>“git checkout &lt;filename&gt;” reverts the file to the</a:t>
             </a:r>
             <a:r>
               <a:rPr lang="en-CA" baseline="0" dirty="0" smtClean="0"/>
-              <a:t> the link to the clipboard</a:t>
-            </a:r>
-          </a:p>
-          <a:p>
-            <a:r>
-              <a:rPr lang="en-CA" baseline="0" dirty="0" smtClean="0"/>
-              <a:t>4. Use the link to set the origin</a:t>
-            </a:r>
-          </a:p>
-          <a:p>
-            <a:r>
-              <a:rPr lang="en-CA" baseline="0" dirty="0" smtClean="0"/>
-              <a:t>5. Push your commits to the remote repository</a:t>
+              <a:t> previous commit. You can even do this with the entire directory. We’ll dive deeper into this command during the next tutorial.</a:t>
             </a:r>
             <a:endParaRPr lang="en-CA" dirty="0"/>
           </a:p>
@@ -4502,7 +4917,7 @@
     </p:spTree>
     <p:extLst>
       <p:ext uri="{BB962C8B-B14F-4D97-AF65-F5344CB8AC3E}">
-        <p14:creationId xmlns:p14="http://schemas.microsoft.com/office/powerpoint/2010/main" val="751109660"/>
+        <p14:creationId xmlns:p14="http://schemas.microsoft.com/office/powerpoint/2010/main" val="2903289575"/>
       </p:ext>
     </p:extLst>
   </p:cSld>
@@ -4558,11 +4973,42 @@
           <a:p>
             <a:r>
               <a:rPr lang="en-CA" dirty="0" smtClean="0"/>
-              <a:t>Now that</a:t>
+              <a:t>We now need to sync</a:t>
             </a:r>
             <a:r>
               <a:rPr lang="en-CA" baseline="0" dirty="0" smtClean="0"/>
-              <a:t> you have linked your local repository to one in the cloud, you can push commit to synchronize the remote repo, or pull commits to synchronize the local repo.</a:t>
+              <a:t> our work to the cloud.</a:t>
+            </a:r>
+          </a:p>
+          <a:p>
+            <a:endParaRPr lang="en-CA" baseline="0" dirty="0" smtClean="0"/>
+          </a:p>
+          <a:p>
+            <a:r>
+              <a:rPr lang="en-CA" baseline="0" dirty="0" smtClean="0"/>
+              <a:t>Start by</a:t>
+            </a:r>
+          </a:p>
+          <a:p>
+            <a:pPr marL="228600" indent="-228600">
+              <a:buAutoNum type="arabicPeriod"/>
+            </a:pPr>
+            <a:r>
+              <a:rPr lang="en-CA" baseline="0" dirty="0" smtClean="0"/>
+              <a:t>going to the link </a:t>
+            </a:r>
+          </a:p>
+          <a:p>
+            <a:pPr marL="228600" indent="-228600">
+              <a:buAutoNum type="arabicPeriod"/>
+            </a:pPr>
+            <a:r>
+              <a:rPr lang="en-CA" baseline="0" dirty="0" smtClean="0"/>
+              <a:t>and creating a new repository on </a:t>
+            </a:r>
+            <a:r>
+              <a:rPr lang="en-CA" baseline="0" dirty="0" err="1" smtClean="0"/>
+              <a:t>github</a:t>
             </a:r>
             <a:endParaRPr lang="en-CA" dirty="0"/>
           </a:p>
@@ -4594,7 +5040,7 @@
     </p:spTree>
     <p:extLst>
       <p:ext uri="{BB962C8B-B14F-4D97-AF65-F5344CB8AC3E}">
-        <p14:creationId xmlns:p14="http://schemas.microsoft.com/office/powerpoint/2010/main" val="247540964"/>
+        <p14:creationId xmlns:p14="http://schemas.microsoft.com/office/powerpoint/2010/main" val="3730388118"/>
       </p:ext>
     </p:extLst>
   </p:cSld>
@@ -4650,16 +5096,25 @@
           <a:p>
             <a:r>
               <a:rPr lang="en-CA" dirty="0" smtClean="0"/>
-              <a:t>Do the tutorials in link</a:t>
+              <a:t>3. Copy</a:t>
             </a:r>
             <a:r>
               <a:rPr lang="en-CA" baseline="0" dirty="0" smtClean="0"/>
-              <a:t> </a:t>
-            </a:r>
-            <a:r>
-              <a:rPr lang="en-CA" baseline="0" smtClean="0"/>
-              <a:t>2 and 3</a:t>
-            </a:r>
+              <a:t> the link to the clipboard</a:t>
+            </a:r>
+          </a:p>
+          <a:p>
+            <a:r>
+              <a:rPr lang="en-CA" baseline="0" dirty="0" smtClean="0"/>
+              <a:t>4. Use the link to set the origin</a:t>
+            </a:r>
+          </a:p>
+          <a:p>
+            <a:r>
+              <a:rPr lang="en-CA" baseline="0" dirty="0" smtClean="0"/>
+              <a:t>5. Push your commits to the remote repository</a:t>
+            </a:r>
+            <a:endParaRPr lang="en-CA" dirty="0"/>
           </a:p>
         </p:txBody>
       </p:sp>
@@ -4681,6 +5136,182 @@
             <a:fld id="{266FFDD2-8F09-4B95-855D-B6E7196B1E6E}" type="slidenum">
               <a:rPr lang="en-US" smtClean="0"/>
               <a:t>27</a:t>
+            </a:fld>
+            <a:endParaRPr lang="en-US"/>
+          </a:p>
+        </p:txBody>
+      </p:sp>
+    </p:spTree>
+    <p:extLst>
+      <p:ext uri="{BB962C8B-B14F-4D97-AF65-F5344CB8AC3E}">
+        <p14:creationId xmlns:p14="http://schemas.microsoft.com/office/powerpoint/2010/main" val="751109660"/>
+      </p:ext>
+    </p:extLst>
+  </p:cSld>
+  <p:clrMapOvr>
+    <a:masterClrMapping/>
+  </p:clrMapOvr>
+</p:notes>
+</file>
+
+<file path=ppt/notesSlides/notesSlide25.xml><?xml version="1.0" encoding="utf-8"?>
+<p:notes xmlns:a="http://schemas.openxmlformats.org/drawingml/2006/main" xmlns:r="http://schemas.openxmlformats.org/officeDocument/2006/relationships" xmlns:p="http://schemas.openxmlformats.org/presentationml/2006/main">
+  <p:cSld>
+    <p:spTree>
+      <p:nvGrpSpPr>
+        <p:cNvPr id="1" name=""/>
+        <p:cNvGrpSpPr/>
+        <p:nvPr/>
+      </p:nvGrpSpPr>
+      <p:grpSpPr>
+        <a:xfrm>
+          <a:off x="0" y="0"/>
+          <a:ext cx="0" cy="0"/>
+          <a:chOff x="0" y="0"/>
+          <a:chExt cx="0" cy="0"/>
+        </a:xfrm>
+      </p:grpSpPr>
+      <p:sp>
+        <p:nvSpPr>
+          <p:cNvPr id="2" name="Slide Image Placeholder 1"/>
+          <p:cNvSpPr>
+            <a:spLocks noGrp="1" noRot="1" noChangeAspect="1"/>
+          </p:cNvSpPr>
+          <p:nvPr>
+            <p:ph type="sldImg"/>
+          </p:nvPr>
+        </p:nvSpPr>
+        <p:spPr/>
+      </p:sp>
+      <p:sp>
+        <p:nvSpPr>
+          <p:cNvPr id="3" name="Notes Placeholder 2"/>
+          <p:cNvSpPr>
+            <a:spLocks noGrp="1"/>
+          </p:cNvSpPr>
+          <p:nvPr>
+            <p:ph type="body" idx="1"/>
+          </p:nvPr>
+        </p:nvSpPr>
+        <p:spPr/>
+        <p:txBody>
+          <a:bodyPr/>
+          <a:lstStyle/>
+          <a:p>
+            <a:r>
+              <a:rPr lang="en-CA" dirty="0" smtClean="0"/>
+              <a:t>Now that</a:t>
+            </a:r>
+            <a:r>
+              <a:rPr lang="en-CA" baseline="0" dirty="0" smtClean="0"/>
+              <a:t> you have linked your local repository to one in the cloud, you can push commit to synchronize the remote repo, or pull commits to synchronize the local repo.</a:t>
+            </a:r>
+            <a:endParaRPr lang="en-CA" dirty="0"/>
+          </a:p>
+        </p:txBody>
+      </p:sp>
+      <p:sp>
+        <p:nvSpPr>
+          <p:cNvPr id="4" name="Slide Number Placeholder 3"/>
+          <p:cNvSpPr>
+            <a:spLocks noGrp="1"/>
+          </p:cNvSpPr>
+          <p:nvPr>
+            <p:ph type="sldNum" sz="quarter" idx="10"/>
+          </p:nvPr>
+        </p:nvSpPr>
+        <p:spPr/>
+        <p:txBody>
+          <a:bodyPr/>
+          <a:lstStyle/>
+          <a:p>
+            <a:fld id="{266FFDD2-8F09-4B95-855D-B6E7196B1E6E}" type="slidenum">
+              <a:rPr lang="en-US" smtClean="0"/>
+              <a:t>28</a:t>
+            </a:fld>
+            <a:endParaRPr lang="en-US"/>
+          </a:p>
+        </p:txBody>
+      </p:sp>
+    </p:spTree>
+    <p:extLst>
+      <p:ext uri="{BB962C8B-B14F-4D97-AF65-F5344CB8AC3E}">
+        <p14:creationId xmlns:p14="http://schemas.microsoft.com/office/powerpoint/2010/main" val="247540964"/>
+      </p:ext>
+    </p:extLst>
+  </p:cSld>
+  <p:clrMapOvr>
+    <a:masterClrMapping/>
+  </p:clrMapOvr>
+</p:notes>
+</file>
+
+<file path=ppt/notesSlides/notesSlide26.xml><?xml version="1.0" encoding="utf-8"?>
+<p:notes xmlns:a="http://schemas.openxmlformats.org/drawingml/2006/main" xmlns:r="http://schemas.openxmlformats.org/officeDocument/2006/relationships" xmlns:p="http://schemas.openxmlformats.org/presentationml/2006/main">
+  <p:cSld>
+    <p:spTree>
+      <p:nvGrpSpPr>
+        <p:cNvPr id="1" name=""/>
+        <p:cNvGrpSpPr/>
+        <p:nvPr/>
+      </p:nvGrpSpPr>
+      <p:grpSpPr>
+        <a:xfrm>
+          <a:off x="0" y="0"/>
+          <a:ext cx="0" cy="0"/>
+          <a:chOff x="0" y="0"/>
+          <a:chExt cx="0" cy="0"/>
+        </a:xfrm>
+      </p:grpSpPr>
+      <p:sp>
+        <p:nvSpPr>
+          <p:cNvPr id="2" name="Slide Image Placeholder 1"/>
+          <p:cNvSpPr>
+            <a:spLocks noGrp="1" noRot="1" noChangeAspect="1"/>
+          </p:cNvSpPr>
+          <p:nvPr>
+            <p:ph type="sldImg"/>
+          </p:nvPr>
+        </p:nvSpPr>
+        <p:spPr/>
+      </p:sp>
+      <p:sp>
+        <p:nvSpPr>
+          <p:cNvPr id="3" name="Notes Placeholder 2"/>
+          <p:cNvSpPr>
+            <a:spLocks noGrp="1"/>
+          </p:cNvSpPr>
+          <p:nvPr>
+            <p:ph type="body" idx="1"/>
+          </p:nvPr>
+        </p:nvSpPr>
+        <p:spPr/>
+        <p:txBody>
+          <a:bodyPr/>
+          <a:lstStyle/>
+          <a:p>
+            <a:endParaRPr lang="en-CA" baseline="0" dirty="0" smtClean="0"/>
+          </a:p>
+        </p:txBody>
+      </p:sp>
+      <p:sp>
+        <p:nvSpPr>
+          <p:cNvPr id="4" name="Slide Number Placeholder 3"/>
+          <p:cNvSpPr>
+            <a:spLocks noGrp="1"/>
+          </p:cNvSpPr>
+          <p:nvPr>
+            <p:ph type="sldNum" sz="quarter" idx="10"/>
+          </p:nvPr>
+        </p:nvSpPr>
+        <p:spPr/>
+        <p:txBody>
+          <a:bodyPr/>
+          <a:lstStyle/>
+          <a:p>
+            <a:fld id="{266FFDD2-8F09-4B95-855D-B6E7196B1E6E}" type="slidenum">
+              <a:rPr lang="en-US" smtClean="0"/>
+              <a:t>30</a:t>
             </a:fld>
             <a:endParaRPr lang="en-US"/>
           </a:p>
@@ -4764,7 +5395,7 @@
           <a:p>
             <a:fld id="{266FFDD2-8F09-4B95-855D-B6E7196B1E6E}" type="slidenum">
               <a:rPr lang="en-US"/>
-              <a:t>4</a:t>
+              <a:t>5</a:t>
             </a:fld>
             <a:endParaRPr lang="en-US"/>
           </a:p>
@@ -4848,7 +5479,7 @@
           <a:p>
             <a:fld id="{266FFDD2-8F09-4B95-855D-B6E7196B1E6E}" type="slidenum">
               <a:rPr lang="en-US"/>
-              <a:t>5</a:t>
+              <a:t>6</a:t>
             </a:fld>
             <a:endParaRPr lang="en-US"/>
           </a:p>
@@ -4970,7 +5601,7 @@
           <a:p>
             <a:fld id="{266FFDD2-8F09-4B95-855D-B6E7196B1E6E}" type="slidenum">
               <a:rPr lang="en-US"/>
-              <a:t>6</a:t>
+              <a:t>7</a:t>
             </a:fld>
             <a:endParaRPr lang="en-US"/>
           </a:p>
@@ -5033,13 +5664,73 @@
           <a:bodyPr/>
           <a:lstStyle/>
           <a:p>
+            <a:pPr marL="228600" indent="-228600">
+              <a:buAutoNum type="arabicPeriod"/>
+            </a:pPr>
             <a:r>
               <a:rPr lang="en-CA" dirty="0" smtClean="0"/>
-              <a:t>A demonstration</a:t>
+              <a:t>Configure</a:t>
             </a:r>
             <a:r>
               <a:rPr lang="en-CA" baseline="0" dirty="0" smtClean="0"/>
-              <a:t> will be shown in class</a:t>
+              <a:t> your username</a:t>
+            </a:r>
+          </a:p>
+          <a:p>
+            <a:pPr marL="228600" indent="-228600">
+              <a:buAutoNum type="arabicPeriod"/>
+            </a:pPr>
+            <a:r>
+              <a:rPr lang="en-CA" baseline="0" dirty="0" smtClean="0"/>
+              <a:t>Configure your email</a:t>
+            </a:r>
+          </a:p>
+          <a:p>
+            <a:pPr marL="228600" indent="-228600">
+              <a:buAutoNum type="arabicPeriod"/>
+            </a:pPr>
+            <a:r>
+              <a:rPr lang="en-CA" baseline="0" dirty="0" smtClean="0"/>
+              <a:t>Configure </a:t>
+            </a:r>
+            <a:r>
+              <a:rPr lang="en-CA" baseline="0" dirty="0" err="1" smtClean="0"/>
+              <a:t>ssh</a:t>
+            </a:r>
+            <a:r>
+              <a:rPr lang="en-CA" baseline="0" dirty="0" smtClean="0"/>
+              <a:t> keys</a:t>
+            </a:r>
+          </a:p>
+          <a:p>
+            <a:pPr marL="228600" indent="-228600">
+              <a:buAutoNum type="arabicPeriod"/>
+            </a:pPr>
+            <a:endParaRPr lang="en-CA" baseline="0" dirty="0" smtClean="0"/>
+          </a:p>
+          <a:p>
+            <a:pPr marL="0" indent="0">
+              <a:buNone/>
+            </a:pPr>
+            <a:r>
+              <a:rPr lang="en-CA" baseline="0" dirty="0" smtClean="0"/>
+              <a:t>Make sure that the username and email you put are the same as you have on </a:t>
+            </a:r>
+            <a:r>
+              <a:rPr lang="en-CA" baseline="0" dirty="0" err="1" smtClean="0"/>
+              <a:t>github</a:t>
+            </a:r>
+            <a:r>
+              <a:rPr lang="en-CA" baseline="0" dirty="0" smtClean="0"/>
+              <a:t>. SSH keys are like your password. </a:t>
+            </a:r>
+            <a:r>
+              <a:rPr lang="en-CA" baseline="0" dirty="0" err="1" smtClean="0"/>
+              <a:t>Github</a:t>
+            </a:r>
+            <a:r>
+              <a:rPr lang="en-CA" baseline="0" dirty="0" smtClean="0"/>
+              <a:t> compares the SSH keys coming from git to make sure its really you.</a:t>
             </a:r>
             <a:endParaRPr lang="en-CA" dirty="0"/>
           </a:p>
@@ -5062,7 +5753,7 @@
           <a:p>
             <a:fld id="{266FFDD2-8F09-4B95-855D-B6E7196B1E6E}" type="slidenum">
               <a:rPr lang="en-US" smtClean="0"/>
-              <a:t>7</a:t>
+              <a:t>8</a:t>
             </a:fld>
             <a:endParaRPr lang="en-US"/>
           </a:p>
@@ -5071,7 +5762,7 @@
     </p:spTree>
     <p:extLst>
       <p:ext uri="{BB962C8B-B14F-4D97-AF65-F5344CB8AC3E}">
-        <p14:creationId xmlns:p14="http://schemas.microsoft.com/office/powerpoint/2010/main" val="2841306172"/>
+        <p14:creationId xmlns:p14="http://schemas.microsoft.com/office/powerpoint/2010/main" val="2397587035"/>
       </p:ext>
     </p:extLst>
   </p:cSld>
@@ -5196,7 +5887,7 @@
           <a:p>
             <a:fld id="{266FFDD2-8F09-4B95-855D-B6E7196B1E6E}" type="slidenum">
               <a:rPr lang="en-US"/>
-              <a:t>8</a:t>
+              <a:t>9</a:t>
             </a:fld>
             <a:endParaRPr lang="en-US"/>
           </a:p>
@@ -5291,7 +5982,7 @@
           <a:p>
             <a:fld id="{266FFDD2-8F09-4B95-855D-B6E7196B1E6E}" type="slidenum">
               <a:rPr lang="en-US"/>
-              <a:t>9</a:t>
+              <a:t>10</a:t>
             </a:fld>
             <a:endParaRPr lang="en-US"/>
           </a:p>
@@ -5375,7 +6066,7 @@
           <a:p>
             <a:fld id="{266FFDD2-8F09-4B95-855D-B6E7196B1E6E}" type="slidenum">
               <a:rPr lang="en-US" smtClean="0"/>
-              <a:t>10</a:t>
+              <a:t>11</a:t>
             </a:fld>
             <a:endParaRPr lang="en-US"/>
           </a:p>
@@ -5525,7 +6216,7 @@
           <a:p>
             <a:fld id="{846CE7D5-CF57-46EF-B807-FDD0502418D4}" type="datetimeFigureOut">
               <a:rPr lang="en-US" smtClean="0"/>
-              <a:t>9/5/2014</a:t>
+              <a:t>9/7/2014</a:t>
             </a:fld>
             <a:endParaRPr lang="en-US"/>
           </a:p>
@@ -5576,7 +6267,7 @@
     </p:spTree>
     <p:extLst>
       <p:ext uri="{BB962C8B-B14F-4D97-AF65-F5344CB8AC3E}">
-        <p14:creationId xmlns:p14="http://schemas.microsoft.com/office/powerpoint/2010/main" val="2984348497"/>
+        <p14:creationId xmlns:p14="http://schemas.microsoft.com/office/powerpoint/2010/main" val="2934874994"/>
       </p:ext>
     </p:extLst>
   </p:cSld>
@@ -5695,7 +6386,7 @@
           <a:p>
             <a:fld id="{846CE7D5-CF57-46EF-B807-FDD0502418D4}" type="datetimeFigureOut">
               <a:rPr lang="en-US" smtClean="0"/>
-              <a:t>9/5/2014</a:t>
+              <a:t>9/7/2014</a:t>
             </a:fld>
             <a:endParaRPr lang="en-US"/>
           </a:p>
@@ -5746,7 +6437,7 @@
     </p:spTree>
     <p:extLst>
       <p:ext uri="{BB962C8B-B14F-4D97-AF65-F5344CB8AC3E}">
-        <p14:creationId xmlns:p14="http://schemas.microsoft.com/office/powerpoint/2010/main" val="339623578"/>
+        <p14:creationId xmlns:p14="http://schemas.microsoft.com/office/powerpoint/2010/main" val="3661757073"/>
       </p:ext>
     </p:extLst>
   </p:cSld>
@@ -5875,7 +6566,7 @@
           <a:p>
             <a:fld id="{846CE7D5-CF57-46EF-B807-FDD0502418D4}" type="datetimeFigureOut">
               <a:rPr lang="en-US" smtClean="0"/>
-              <a:t>9/5/2014</a:t>
+              <a:t>9/7/2014</a:t>
             </a:fld>
             <a:endParaRPr lang="en-US"/>
           </a:p>
@@ -5926,7 +6617,7 @@
     </p:spTree>
     <p:extLst>
       <p:ext uri="{BB962C8B-B14F-4D97-AF65-F5344CB8AC3E}">
-        <p14:creationId xmlns:p14="http://schemas.microsoft.com/office/powerpoint/2010/main" val="2705119741"/>
+        <p14:creationId xmlns:p14="http://schemas.microsoft.com/office/powerpoint/2010/main" val="3429448095"/>
       </p:ext>
     </p:extLst>
   </p:cSld>
@@ -6045,7 +6736,7 @@
           <a:p>
             <a:fld id="{846CE7D5-CF57-46EF-B807-FDD0502418D4}" type="datetimeFigureOut">
               <a:rPr lang="en-US" smtClean="0"/>
-              <a:t>9/5/2014</a:t>
+              <a:t>9/7/2014</a:t>
             </a:fld>
             <a:endParaRPr lang="en-US"/>
           </a:p>
@@ -6096,7 +6787,7 @@
     </p:spTree>
     <p:extLst>
       <p:ext uri="{BB962C8B-B14F-4D97-AF65-F5344CB8AC3E}">
-        <p14:creationId xmlns:p14="http://schemas.microsoft.com/office/powerpoint/2010/main" val="1565409080"/>
+        <p14:creationId xmlns:p14="http://schemas.microsoft.com/office/powerpoint/2010/main" val="1981072192"/>
       </p:ext>
     </p:extLst>
   </p:cSld>
@@ -6291,7 +6982,7 @@
           <a:p>
             <a:fld id="{846CE7D5-CF57-46EF-B807-FDD0502418D4}" type="datetimeFigureOut">
               <a:rPr lang="en-US" smtClean="0"/>
-              <a:t>9/5/2014</a:t>
+              <a:t>9/7/2014</a:t>
             </a:fld>
             <a:endParaRPr lang="en-US"/>
           </a:p>
@@ -6342,7 +7033,7 @@
     </p:spTree>
     <p:extLst>
       <p:ext uri="{BB962C8B-B14F-4D97-AF65-F5344CB8AC3E}">
-        <p14:creationId xmlns:p14="http://schemas.microsoft.com/office/powerpoint/2010/main" val="2504384278"/>
+        <p14:creationId xmlns:p14="http://schemas.microsoft.com/office/powerpoint/2010/main" val="4192038347"/>
       </p:ext>
     </p:extLst>
   </p:cSld>
@@ -6523,7 +7214,7 @@
           <a:p>
             <a:fld id="{846CE7D5-CF57-46EF-B807-FDD0502418D4}" type="datetimeFigureOut">
               <a:rPr lang="en-US" smtClean="0"/>
-              <a:t>9/5/2014</a:t>
+              <a:t>9/7/2014</a:t>
             </a:fld>
             <a:endParaRPr lang="en-US"/>
           </a:p>
@@ -6574,7 +7265,7 @@
     </p:spTree>
     <p:extLst>
       <p:ext uri="{BB962C8B-B14F-4D97-AF65-F5344CB8AC3E}">
-        <p14:creationId xmlns:p14="http://schemas.microsoft.com/office/powerpoint/2010/main" val="3592454627"/>
+        <p14:creationId xmlns:p14="http://schemas.microsoft.com/office/powerpoint/2010/main" val="351519073"/>
       </p:ext>
     </p:extLst>
   </p:cSld>
@@ -6890,7 +7581,7 @@
           <a:p>
             <a:fld id="{846CE7D5-CF57-46EF-B807-FDD0502418D4}" type="datetimeFigureOut">
               <a:rPr lang="en-US" smtClean="0"/>
-              <a:t>9/5/2014</a:t>
+              <a:t>9/7/2014</a:t>
             </a:fld>
             <a:endParaRPr lang="en-US"/>
           </a:p>
@@ -6941,7 +7632,7 @@
     </p:spTree>
     <p:extLst>
       <p:ext uri="{BB962C8B-B14F-4D97-AF65-F5344CB8AC3E}">
-        <p14:creationId xmlns:p14="http://schemas.microsoft.com/office/powerpoint/2010/main" val="1918445993"/>
+        <p14:creationId xmlns:p14="http://schemas.microsoft.com/office/powerpoint/2010/main" val="1845340527"/>
       </p:ext>
     </p:extLst>
   </p:cSld>
@@ -7008,7 +7699,7 @@
           <a:p>
             <a:fld id="{846CE7D5-CF57-46EF-B807-FDD0502418D4}" type="datetimeFigureOut">
               <a:rPr lang="en-US" smtClean="0"/>
-              <a:t>9/5/2014</a:t>
+              <a:t>9/7/2014</a:t>
             </a:fld>
             <a:endParaRPr lang="en-US"/>
           </a:p>
@@ -7059,7 +7750,7 @@
     </p:spTree>
     <p:extLst>
       <p:ext uri="{BB962C8B-B14F-4D97-AF65-F5344CB8AC3E}">
-        <p14:creationId xmlns:p14="http://schemas.microsoft.com/office/powerpoint/2010/main" val="3560000283"/>
+        <p14:creationId xmlns:p14="http://schemas.microsoft.com/office/powerpoint/2010/main" val="624678295"/>
       </p:ext>
     </p:extLst>
   </p:cSld>
@@ -7103,7 +7794,7 @@
           <a:p>
             <a:fld id="{846CE7D5-CF57-46EF-B807-FDD0502418D4}" type="datetimeFigureOut">
               <a:rPr lang="en-US" smtClean="0"/>
-              <a:t>9/5/2014</a:t>
+              <a:t>9/7/2014</a:t>
             </a:fld>
             <a:endParaRPr lang="en-US"/>
           </a:p>
@@ -7154,7 +7845,7 @@
     </p:spTree>
     <p:extLst>
       <p:ext uri="{BB962C8B-B14F-4D97-AF65-F5344CB8AC3E}">
-        <p14:creationId xmlns:p14="http://schemas.microsoft.com/office/powerpoint/2010/main" val="1789263358"/>
+        <p14:creationId xmlns:p14="http://schemas.microsoft.com/office/powerpoint/2010/main" val="1747310176"/>
       </p:ext>
     </p:extLst>
   </p:cSld>
@@ -7380,7 +8071,7 @@
           <a:p>
             <a:fld id="{846CE7D5-CF57-46EF-B807-FDD0502418D4}" type="datetimeFigureOut">
               <a:rPr lang="en-US" smtClean="0"/>
-              <a:t>9/5/2014</a:t>
+              <a:t>9/7/2014</a:t>
             </a:fld>
             <a:endParaRPr lang="en-US"/>
           </a:p>
@@ -7431,7 +8122,7 @@
     </p:spTree>
     <p:extLst>
       <p:ext uri="{BB962C8B-B14F-4D97-AF65-F5344CB8AC3E}">
-        <p14:creationId xmlns:p14="http://schemas.microsoft.com/office/powerpoint/2010/main" val="64804154"/>
+        <p14:creationId xmlns:p14="http://schemas.microsoft.com/office/powerpoint/2010/main" val="2859517180"/>
       </p:ext>
     </p:extLst>
   </p:cSld>
@@ -7633,7 +8324,7 @@
           <a:p>
             <a:fld id="{846CE7D5-CF57-46EF-B807-FDD0502418D4}" type="datetimeFigureOut">
               <a:rPr lang="en-US" smtClean="0"/>
-              <a:t>9/5/2014</a:t>
+              <a:t>9/7/2014</a:t>
             </a:fld>
             <a:endParaRPr lang="en-US"/>
           </a:p>
@@ -7654,7 +8345,7 @@
           <a:bodyPr/>
           <a:lstStyle/>
           <a:p>
-            <a:endParaRPr lang="en-US"/>
+            <a:endParaRPr lang="en-US" dirty="0"/>
           </a:p>
         </p:txBody>
       </p:sp>
@@ -7684,7 +8375,7 @@
     </p:spTree>
     <p:extLst>
       <p:ext uri="{BB962C8B-B14F-4D97-AF65-F5344CB8AC3E}">
-        <p14:creationId xmlns:p14="http://schemas.microsoft.com/office/powerpoint/2010/main" val="1572195681"/>
+        <p14:creationId xmlns:p14="http://schemas.microsoft.com/office/powerpoint/2010/main" val="1733850726"/>
       </p:ext>
     </p:extLst>
   </p:cSld>
@@ -7846,7 +8537,7 @@
           <a:p>
             <a:fld id="{846CE7D5-CF57-46EF-B807-FDD0502418D4}" type="datetimeFigureOut">
               <a:rPr lang="en-US" smtClean="0"/>
-              <a:t>9/5/2014</a:t>
+              <a:t>9/7/2014</a:t>
             </a:fld>
             <a:endParaRPr lang="en-US"/>
           </a:p>
@@ -7933,23 +8624,23 @@
     </p:spTree>
     <p:extLst>
       <p:ext uri="{BB962C8B-B14F-4D97-AF65-F5344CB8AC3E}">
-        <p14:creationId xmlns:p14="http://schemas.microsoft.com/office/powerpoint/2010/main" val="1979090839"/>
+        <p14:creationId xmlns:p14="http://schemas.microsoft.com/office/powerpoint/2010/main" val="2223886884"/>
       </p:ext>
     </p:extLst>
   </p:cSld>
   <p:clrMap bg1="lt1" tx1="dk1" bg2="lt2" tx2="dk2" accent1="accent1" accent2="accent2" accent3="accent3" accent4="accent4" accent5="accent5" accent6="accent6" hlink="hlink" folHlink="folHlink"/>
   <p:sldLayoutIdLst>
-    <p:sldLayoutId id="2147483865" r:id="rId1"/>
-    <p:sldLayoutId id="2147483866" r:id="rId2"/>
-    <p:sldLayoutId id="2147483867" r:id="rId3"/>
-    <p:sldLayoutId id="2147483868" r:id="rId4"/>
-    <p:sldLayoutId id="2147483869" r:id="rId5"/>
-    <p:sldLayoutId id="2147483870" r:id="rId6"/>
-    <p:sldLayoutId id="2147483871" r:id="rId7"/>
-    <p:sldLayoutId id="2147483872" r:id="rId8"/>
-    <p:sldLayoutId id="2147483873" r:id="rId9"/>
-    <p:sldLayoutId id="2147483874" r:id="rId10"/>
-    <p:sldLayoutId id="2147483875" r:id="rId11"/>
+    <p:sldLayoutId id="2147483995" r:id="rId1"/>
+    <p:sldLayoutId id="2147483996" r:id="rId2"/>
+    <p:sldLayoutId id="2147483997" r:id="rId3"/>
+    <p:sldLayoutId id="2147483998" r:id="rId4"/>
+    <p:sldLayoutId id="2147483999" r:id="rId5"/>
+    <p:sldLayoutId id="2147484000" r:id="rId6"/>
+    <p:sldLayoutId id="2147484001" r:id="rId7"/>
+    <p:sldLayoutId id="2147484002" r:id="rId8"/>
+    <p:sldLayoutId id="2147484003" r:id="rId9"/>
+    <p:sldLayoutId id="2147484004" r:id="rId10"/>
+    <p:sldLayoutId id="2147484005" r:id="rId11"/>
   </p:sldLayoutIdLst>
   <p:txStyles>
     <p:titleStyle>
@@ -8425,6 +9116,90 @@
             <p:ph type="title"/>
           </p:nvPr>
         </p:nvSpPr>
+        <p:spPr/>
+        <p:txBody>
+          <a:bodyPr/>
+          <a:lstStyle/>
+          <a:p>
+            <a:r>
+              <a:rPr lang="en-US" dirty="0" smtClean="0"/>
+              <a:t>Getting the class notes</a:t>
+            </a:r>
+            <a:endParaRPr lang="en-US" dirty="0"/>
+          </a:p>
+        </p:txBody>
+      </p:sp>
+      <p:pic>
+        <p:nvPicPr>
+          <p:cNvPr id="5" name="Picture 4"/>
+          <p:cNvPicPr>
+            <a:picLocks noChangeAspect="1"/>
+          </p:cNvPicPr>
+          <p:nvPr/>
+        </p:nvPicPr>
+        <p:blipFill>
+          <a:blip r:embed="rId3"/>
+          <a:stretch>
+            <a:fillRect/>
+          </a:stretch>
+        </p:blipFill>
+        <p:spPr>
+          <a:xfrm>
+            <a:off x="838200" y="1811597"/>
+            <a:ext cx="10170523" cy="2159901"/>
+          </a:xfrm>
+          <a:prstGeom prst="rect">
+            <a:avLst/>
+          </a:prstGeom>
+        </p:spPr>
+      </p:pic>
+    </p:spTree>
+    <p:extLst>
+      <p:ext uri="{BB962C8B-B14F-4D97-AF65-F5344CB8AC3E}">
+        <p14:creationId xmlns:p14="http://schemas.microsoft.com/office/powerpoint/2010/main" val="2070679325"/>
+      </p:ext>
+    </p:extLst>
+  </p:cSld>
+  <p:clrMapOvr>
+    <a:masterClrMapping/>
+  </p:clrMapOvr>
+  <p:timing>
+    <p:tnLst>
+      <p:par>
+        <p:cTn id="1" dur="indefinite" restart="never" nodeType="tmRoot"/>
+      </p:par>
+    </p:tnLst>
+  </p:timing>
+</p:sld>
+</file>
+
+<file path=ppt/slides/slide11.xml><?xml version="1.0" encoding="utf-8"?>
+<p:sld xmlns:a="http://schemas.openxmlformats.org/drawingml/2006/main" xmlns:r="http://schemas.openxmlformats.org/officeDocument/2006/relationships" xmlns:p="http://schemas.openxmlformats.org/presentationml/2006/main">
+  <p:cSld>
+    <p:spTree>
+      <p:nvGrpSpPr>
+        <p:cNvPr id="1" name=""/>
+        <p:cNvGrpSpPr/>
+        <p:nvPr/>
+      </p:nvGrpSpPr>
+      <p:grpSpPr>
+        <a:xfrm>
+          <a:off x="0" y="0"/>
+          <a:ext cx="0" cy="0"/>
+          <a:chOff x="0" y="0"/>
+          <a:chExt cx="0" cy="0"/>
+        </a:xfrm>
+      </p:grpSpPr>
+      <p:sp>
+        <p:nvSpPr>
+          <p:cNvPr id="2" name="Title 1"/>
+          <p:cNvSpPr>
+            <a:spLocks noGrp="1"/>
+          </p:cNvSpPr>
+          <p:nvPr>
+            <p:ph type="title"/>
+          </p:nvPr>
+        </p:nvSpPr>
         <p:spPr>
           <a:xfrm>
             <a:off x="546100" y="290352"/>
@@ -8628,10 +9403,17 @@
   <p:clrMapOvr>
     <a:masterClrMapping/>
   </p:clrMapOvr>
+  <p:timing>
+    <p:tnLst>
+      <p:par>
+        <p:cTn id="1" dur="indefinite" restart="never" nodeType="tmRoot"/>
+      </p:par>
+    </p:tnLst>
+  </p:timing>
 </p:sld>
 </file>
 
-<file path=ppt/slides/slide11.xml><?xml version="1.0" encoding="utf-8"?>
+<file path=ppt/slides/slide12.xml><?xml version="1.0" encoding="utf-8"?>
 <p:sld xmlns:a="http://schemas.openxmlformats.org/drawingml/2006/main" xmlns:r="http://schemas.openxmlformats.org/officeDocument/2006/relationships" xmlns:p="http://schemas.openxmlformats.org/presentationml/2006/main">
   <p:cSld>
     <p:spTree>
@@ -8731,7 +9513,7 @@
 </p:sld>
 </file>
 
-<file path=ppt/slides/slide12.xml><?xml version="1.0" encoding="utf-8"?>
+<file path=ppt/slides/slide13.xml><?xml version="1.0" encoding="utf-8"?>
 <p:sld xmlns:a="http://schemas.openxmlformats.org/drawingml/2006/main" xmlns:r="http://schemas.openxmlformats.org/officeDocument/2006/relationships" xmlns:p="http://schemas.openxmlformats.org/presentationml/2006/main">
   <p:cSld>
     <p:spTree>
@@ -9227,7 +10009,7 @@
 </p:sld>
 </file>
 
-<file path=ppt/slides/slide13.xml><?xml version="1.0" encoding="utf-8"?>
+<file path=ppt/slides/slide14.xml><?xml version="1.0" encoding="utf-8"?>
 <p:sld xmlns:a="http://schemas.openxmlformats.org/drawingml/2006/main" xmlns:r="http://schemas.openxmlformats.org/officeDocument/2006/relationships" xmlns:p="http://schemas.openxmlformats.org/presentationml/2006/main">
   <p:cSld>
     <p:spTree>
@@ -9569,7 +10351,7 @@
 </p:sld>
 </file>
 
-<file path=ppt/slides/slide14.xml><?xml version="1.0" encoding="utf-8"?>
+<file path=ppt/slides/slide15.xml><?xml version="1.0" encoding="utf-8"?>
 <p:sld xmlns:a="http://schemas.openxmlformats.org/drawingml/2006/main" xmlns:r="http://schemas.openxmlformats.org/officeDocument/2006/relationships" xmlns:p="http://schemas.openxmlformats.org/presentationml/2006/main">
   <p:cSld>
     <p:spTree>
@@ -9786,7 +10568,7 @@
 </p:sld>
 </file>
 
-<file path=ppt/slides/slide15.xml><?xml version="1.0" encoding="utf-8"?>
+<file path=ppt/slides/slide16.xml><?xml version="1.0" encoding="utf-8"?>
 <p:sld xmlns:a="http://schemas.openxmlformats.org/drawingml/2006/main" xmlns:r="http://schemas.openxmlformats.org/officeDocument/2006/relationships" xmlns:p="http://schemas.openxmlformats.org/presentationml/2006/main">
   <p:cSld>
     <p:spTree>
@@ -10121,7 +10903,7 @@
 </p:sld>
 </file>
 
-<file path=ppt/slides/slide16.xml><?xml version="1.0" encoding="utf-8"?>
+<file path=ppt/slides/slide17.xml><?xml version="1.0" encoding="utf-8"?>
 <p:sld xmlns:a="http://schemas.openxmlformats.org/drawingml/2006/main" xmlns:r="http://schemas.openxmlformats.org/officeDocument/2006/relationships" xmlns:p="http://schemas.openxmlformats.org/presentationml/2006/main">
   <p:cSld>
     <p:spTree>
@@ -10155,7 +10937,7 @@
           <a:p>
             <a:r>
               <a:rPr lang="en-CA" dirty="0" smtClean="0"/>
-              <a:t>Workflows in Git</a:t>
+              <a:t>Inside a Repo</a:t>
             </a:r>
             <a:endParaRPr lang="en-CA" dirty="0"/>
           </a:p>
@@ -10212,8 +10994,8 @@
         </p:nvSpPr>
         <p:spPr>
           <a:xfrm>
-            <a:off x="941696" y="2142699"/>
-            <a:ext cx="4612943" cy="1711366"/>
+            <a:off x="665471" y="2370658"/>
+            <a:ext cx="5430529" cy="1338828"/>
           </a:xfrm>
           <a:prstGeom prst="rect">
             <a:avLst/>
@@ -10310,7 +11092,7 @@
 </p:sld>
 </file>
 
-<file path=ppt/slides/slide17.xml><?xml version="1.0" encoding="utf-8"?>
+<file path=ppt/slides/slide18.xml><?xml version="1.0" encoding="utf-8"?>
 <p:sld xmlns:a="http://schemas.openxmlformats.org/drawingml/2006/main" xmlns:r="http://schemas.openxmlformats.org/officeDocument/2006/relationships" xmlns:p="http://schemas.openxmlformats.org/presentationml/2006/main">
   <p:cSld>
     <p:spTree>
@@ -10545,20 +11327,6 @@
               </a:rPr>
               <a:t>2</a:t>
             </a:r>
-            <a:endParaRPr lang="en-CA" dirty="0">
-              <a:ln w="0"/>
-              <a:solidFill>
-                <a:schemeClr val="bg1"/>
-              </a:solidFill>
-              <a:effectLst>
-                <a:outerShdw blurRad="38100" dist="19050" dir="2700000" algn="tl" rotWithShape="0">
-                  <a:schemeClr val="dk1">
-                    <a:alpha val="40000"/>
-                  </a:schemeClr>
-                </a:outerShdw>
-              </a:effectLst>
-              <a:latin typeface="Arial Black" panose="020B0A04020102020204" pitchFamily="34" charset="0"/>
-            </a:endParaRPr>
           </a:p>
         </p:txBody>
       </p:sp>
@@ -10645,7 +11413,7 @@
 </p:sld>
 </file>
 
-<file path=ppt/slides/slide18.xml><?xml version="1.0" encoding="utf-8"?>
+<file path=ppt/slides/slide19.xml><?xml version="1.0" encoding="utf-8"?>
 <p:sld xmlns:a="http://schemas.openxmlformats.org/drawingml/2006/main" xmlns:r="http://schemas.openxmlformats.org/officeDocument/2006/relationships" xmlns:p="http://schemas.openxmlformats.org/presentationml/2006/main">
   <p:cSld>
     <p:spTree>
@@ -10888,20 +11656,6 @@
               </a:rPr>
               <a:t>2</a:t>
             </a:r>
-            <a:endParaRPr lang="en-CA" dirty="0">
-              <a:ln w="0"/>
-              <a:solidFill>
-                <a:schemeClr val="bg1"/>
-              </a:solidFill>
-              <a:effectLst>
-                <a:outerShdw blurRad="38100" dist="19050" dir="2700000" algn="tl" rotWithShape="0">
-                  <a:schemeClr val="dk1">
-                    <a:alpha val="40000"/>
-                  </a:schemeClr>
-                </a:outerShdw>
-              </a:effectLst>
-              <a:latin typeface="Arial Black" panose="020B0A04020102020204" pitchFamily="34" charset="0"/>
-            </a:endParaRPr>
           </a:p>
         </p:txBody>
       </p:sp>
@@ -10958,20 +11712,6 @@
               </a:rPr>
               <a:t>3</a:t>
             </a:r>
-            <a:endParaRPr lang="en-CA" dirty="0">
-              <a:ln w="0"/>
-              <a:solidFill>
-                <a:schemeClr val="bg1"/>
-              </a:solidFill>
-              <a:effectLst>
-                <a:outerShdw blurRad="38100" dist="19050" dir="2700000" algn="tl" rotWithShape="0">
-                  <a:schemeClr val="dk1">
-                    <a:alpha val="40000"/>
-                  </a:schemeClr>
-                </a:outerShdw>
-              </a:effectLst>
-              <a:latin typeface="Arial Black" panose="020B0A04020102020204" pitchFamily="34" charset="0"/>
-            </a:endParaRPr>
           </a:p>
         </p:txBody>
       </p:sp>
@@ -10988,7 +11728,187 @@
 </p:sld>
 </file>
 
-<file path=ppt/slides/slide19.xml><?xml version="1.0" encoding="utf-8"?>
+<file path=ppt/slides/slide2.xml><?xml version="1.0" encoding="utf-8"?>
+<p:sld xmlns:a="http://schemas.openxmlformats.org/drawingml/2006/main" xmlns:r="http://schemas.openxmlformats.org/officeDocument/2006/relationships" xmlns:p="http://schemas.openxmlformats.org/presentationml/2006/main">
+  <p:cSld>
+    <p:spTree>
+      <p:nvGrpSpPr>
+        <p:cNvPr id="1" name=""/>
+        <p:cNvGrpSpPr/>
+        <p:nvPr/>
+      </p:nvGrpSpPr>
+      <p:grpSpPr>
+        <a:xfrm>
+          <a:off x="0" y="0"/>
+          <a:ext cx="0" cy="0"/>
+          <a:chOff x="0" y="0"/>
+          <a:chExt cx="0" cy="0"/>
+        </a:xfrm>
+      </p:grpSpPr>
+      <p:sp>
+        <p:nvSpPr>
+          <p:cNvPr id="2" name="Title 1"/>
+          <p:cNvSpPr>
+            <a:spLocks noGrp="1"/>
+          </p:cNvSpPr>
+          <p:nvPr>
+            <p:ph type="title"/>
+          </p:nvPr>
+        </p:nvSpPr>
+        <p:spPr>
+          <a:xfrm>
+            <a:off x="125413" y="228600"/>
+            <a:ext cx="4575175" cy="1600200"/>
+          </a:xfrm>
+        </p:spPr>
+        <p:txBody>
+          <a:bodyPr>
+            <a:normAutofit/>
+          </a:bodyPr>
+          <a:lstStyle/>
+          <a:p>
+            <a:r>
+              <a:rPr lang="en-CA" sz="3600" dirty="0" smtClean="0"/>
+              <a:t>Your TA this semester </a:t>
+            </a:r>
+            <a:endParaRPr lang="en-CA" sz="3600" dirty="0"/>
+          </a:p>
+        </p:txBody>
+      </p:sp>
+      <p:pic>
+        <p:nvPicPr>
+          <p:cNvPr id="6" name="Content Placeholder 5"/>
+          <p:cNvPicPr>
+            <a:picLocks noGrp="1" noChangeAspect="1"/>
+          </p:cNvPicPr>
+          <p:nvPr>
+            <p:ph idx="1"/>
+          </p:nvPr>
+        </p:nvPicPr>
+        <p:blipFill rotWithShape="1">
+          <a:blip r:embed="rId2" cstate="print">
+            <a:extLst>
+              <a:ext uri="{28A0092B-C50C-407E-A947-70E740481C1C}">
+                <a14:useLocalDpi xmlns:a14="http://schemas.microsoft.com/office/drawing/2010/main" val="0"/>
+              </a:ext>
+            </a:extLst>
+          </a:blip>
+          <a:stretch/>
+        </p:blipFill>
+        <p:spPr>
+          <a:xfrm>
+            <a:off x="6857407" y="1123950"/>
+            <a:ext cx="2738038" cy="4873625"/>
+          </a:xfrm>
+        </p:spPr>
+      </p:pic>
+      <p:sp>
+        <p:nvSpPr>
+          <p:cNvPr id="4" name="Text Placeholder 3"/>
+          <p:cNvSpPr>
+            <a:spLocks noGrp="1"/>
+          </p:cNvSpPr>
+          <p:nvPr>
+            <p:ph type="body" sz="half" idx="2"/>
+          </p:nvPr>
+        </p:nvSpPr>
+        <p:spPr>
+          <a:xfrm>
+            <a:off x="225426" y="2185987"/>
+            <a:ext cx="6346825" cy="3811588"/>
+          </a:xfrm>
+        </p:spPr>
+        <p:txBody>
+          <a:bodyPr>
+            <a:normAutofit fontScale="92500" lnSpcReduction="10000"/>
+          </a:bodyPr>
+          <a:lstStyle/>
+          <a:p>
+            <a:r>
+              <a:rPr lang="en-CA" sz="2600" dirty="0" smtClean="0"/>
+              <a:t>Shabbir Hussain</a:t>
+            </a:r>
+          </a:p>
+          <a:p>
+            <a:r>
+              <a:rPr lang="en-CA" sz="2600" dirty="0" smtClean="0"/>
+              <a:t>U4 Electrical Engineering</a:t>
+            </a:r>
+          </a:p>
+          <a:p>
+            <a:r>
+              <a:rPr lang="en-CA" sz="2600" dirty="0" smtClean="0"/>
+              <a:t>Academic Vice President at ECSESS</a:t>
+            </a:r>
+          </a:p>
+          <a:p>
+            <a:r>
+              <a:rPr lang="en-CA" sz="2600" dirty="0" smtClean="0"/>
+              <a:t>Loves to program, eat pizza and take selfies</a:t>
+            </a:r>
+          </a:p>
+          <a:p>
+            <a:endParaRPr lang="en-CA" sz="2600" dirty="0"/>
+          </a:p>
+          <a:p>
+            <a:endParaRPr lang="en-CA" sz="2600" dirty="0" smtClean="0"/>
+          </a:p>
+          <a:p>
+            <a:r>
+              <a:rPr lang="en-CA" sz="2600" dirty="0" smtClean="0"/>
+              <a:t>Contact:</a:t>
+            </a:r>
+          </a:p>
+          <a:p>
+            <a:r>
+              <a:rPr lang="en-CA" sz="2600" dirty="0" smtClean="0">
+                <a:hlinkClick r:id="rId3"/>
+              </a:rPr>
+              <a:t>Mohammad.Hussain@mail.mcgill.ca</a:t>
+            </a:r>
+            <a:endParaRPr lang="en-CA" sz="2600" dirty="0" smtClean="0"/>
+          </a:p>
+          <a:p>
+            <a:r>
+              <a:rPr lang="en-CA" sz="2600" dirty="0">
+                <a:hlinkClick r:id="rId4"/>
+              </a:rPr>
+              <a:t>https://github.com/shabbir-hussain</a:t>
+            </a:r>
+            <a:r>
+              <a:rPr lang="en-CA" sz="2600" dirty="0" smtClean="0">
+                <a:hlinkClick r:id="rId4"/>
+              </a:rPr>
+              <a:t>/</a:t>
+            </a:r>
+            <a:endParaRPr lang="en-CA" sz="2600" dirty="0" smtClean="0"/>
+          </a:p>
+          <a:p>
+            <a:endParaRPr lang="en-CA" dirty="0" smtClean="0"/>
+          </a:p>
+        </p:txBody>
+      </p:sp>
+    </p:spTree>
+    <p:extLst>
+      <p:ext uri="{BB962C8B-B14F-4D97-AF65-F5344CB8AC3E}">
+        <p14:creationId xmlns:p14="http://schemas.microsoft.com/office/powerpoint/2010/main" val="2476417938"/>
+      </p:ext>
+    </p:extLst>
+  </p:cSld>
+  <p:clrMapOvr>
+    <a:masterClrMapping/>
+  </p:clrMapOvr>
+  <p:timing>
+    <p:tnLst>
+      <p:par>
+        <p:cTn id="1" dur="indefinite" restart="never" nodeType="tmRoot"/>
+      </p:par>
+    </p:tnLst>
+  </p:timing>
+</p:sld>
+</file>
+
+<file path=ppt/slides/slide20.xml><?xml version="1.0" encoding="utf-8"?>
 <p:sld xmlns:a="http://schemas.openxmlformats.org/drawingml/2006/main" xmlns:r="http://schemas.openxmlformats.org/officeDocument/2006/relationships" xmlns:p="http://schemas.openxmlformats.org/presentationml/2006/main">
   <p:cSld>
     <p:spTree>
@@ -11073,118 +11993,7 @@
 </p:sld>
 </file>
 
-<file path=ppt/slides/slide2.xml><?xml version="1.0" encoding="utf-8"?>
-<p:sld xmlns:a="http://schemas.openxmlformats.org/drawingml/2006/main" xmlns:r="http://schemas.openxmlformats.org/officeDocument/2006/relationships" xmlns:p="http://schemas.openxmlformats.org/presentationml/2006/main">
-  <p:cSld>
-    <p:spTree>
-      <p:nvGrpSpPr>
-        <p:cNvPr id="1" name=""/>
-        <p:cNvGrpSpPr/>
-        <p:nvPr/>
-      </p:nvGrpSpPr>
-      <p:grpSpPr>
-        <a:xfrm>
-          <a:off x="0" y="0"/>
-          <a:ext cx="0" cy="0"/>
-          <a:chOff x="0" y="0"/>
-          <a:chExt cx="0" cy="0"/>
-        </a:xfrm>
-      </p:grpSpPr>
-      <p:sp>
-        <p:nvSpPr>
-          <p:cNvPr id="2" name="Title 1"/>
-          <p:cNvSpPr>
-            <a:spLocks noGrp="1"/>
-          </p:cNvSpPr>
-          <p:nvPr>
-            <p:ph type="title"/>
-          </p:nvPr>
-        </p:nvSpPr>
-        <p:spPr/>
-        <p:txBody>
-          <a:bodyPr/>
-          <a:lstStyle/>
-          <a:p>
-            <a:r>
-              <a:rPr lang="en-US" dirty="0"/>
-              <a:t>What is </a:t>
-            </a:r>
-            <a:r>
-              <a:rPr lang="en-US" dirty="0" smtClean="0"/>
-              <a:t>Version Control?</a:t>
-            </a:r>
-            <a:endParaRPr lang="en-US" dirty="0"/>
-          </a:p>
-        </p:txBody>
-      </p:sp>
-      <p:sp>
-        <p:nvSpPr>
-          <p:cNvPr id="3" name="Content Placeholder 2"/>
-          <p:cNvSpPr>
-            <a:spLocks noGrp="1"/>
-          </p:cNvSpPr>
-          <p:nvPr>
-            <p:ph idx="1"/>
-          </p:nvPr>
-        </p:nvSpPr>
-        <p:spPr/>
-        <p:txBody>
-          <a:bodyPr/>
-          <a:lstStyle/>
-          <a:p>
-            <a:r>
-              <a:rPr lang="en-US" dirty="0" smtClean="0"/>
-              <a:t>Version Control software is a tool used to keep track of different versions of files</a:t>
-            </a:r>
-          </a:p>
-          <a:p>
-            <a:r>
-              <a:rPr lang="en-US" dirty="0" smtClean="0"/>
-              <a:t>Revert to an old version</a:t>
-            </a:r>
-          </a:p>
-          <a:p>
-            <a:r>
-              <a:rPr lang="en-US" dirty="0" smtClean="0"/>
-              <a:t>Branch to create multiple version</a:t>
-            </a:r>
-          </a:p>
-          <a:p>
-            <a:r>
-              <a:rPr lang="en-US" dirty="0" smtClean="0"/>
-              <a:t>Merge two different versions together</a:t>
-            </a:r>
-          </a:p>
-          <a:p>
-            <a:r>
-              <a:rPr lang="en-US" dirty="0" smtClean="0"/>
-              <a:t>Synchronize files on different machines</a:t>
-            </a:r>
-            <a:endParaRPr lang="en-US" dirty="0"/>
-          </a:p>
-        </p:txBody>
-      </p:sp>
-    </p:spTree>
-    <p:extLst>
-      <p:ext uri="{BB962C8B-B14F-4D97-AF65-F5344CB8AC3E}">
-        <p14:creationId xmlns:p14="http://schemas.microsoft.com/office/powerpoint/2010/main" val="3392569427"/>
-      </p:ext>
-    </p:extLst>
-  </p:cSld>
-  <p:clrMapOvr>
-    <a:masterClrMapping/>
-  </p:clrMapOvr>
-  <p:timing>
-    <p:tnLst>
-      <p:par>
-        <p:cTn id="1" dur="indefinite" restart="never" nodeType="tmRoot"/>
-      </p:par>
-    </p:tnLst>
-  </p:timing>
-</p:sld>
-</file>
-
-<file path=ppt/slides/slide20.xml><?xml version="1.0" encoding="utf-8"?>
+<file path=ppt/slides/slide21.xml><?xml version="1.0" encoding="utf-8"?>
 <p:sld xmlns:a="http://schemas.openxmlformats.org/drawingml/2006/main" xmlns:r="http://schemas.openxmlformats.org/officeDocument/2006/relationships" xmlns:p="http://schemas.openxmlformats.org/presentationml/2006/main">
   <p:cSld>
     <p:spTree>
@@ -11321,7 +12130,7 @@
 </p:sld>
 </file>
 
-<file path=ppt/slides/slide21.xml><?xml version="1.0" encoding="utf-8"?>
+<file path=ppt/slides/slide22.xml><?xml version="1.0" encoding="utf-8"?>
 <p:sld xmlns:a="http://schemas.openxmlformats.org/drawingml/2006/main" xmlns:r="http://schemas.openxmlformats.org/officeDocument/2006/relationships" xmlns:p="http://schemas.openxmlformats.org/presentationml/2006/main">
   <p:cSld>
     <p:spTree>
@@ -11398,7 +12207,7 @@
 </p:sld>
 </file>
 
-<file path=ppt/slides/slide22.xml><?xml version="1.0" encoding="utf-8"?>
+<file path=ppt/slides/slide23.xml><?xml version="1.0" encoding="utf-8"?>
 <p:sld xmlns:a="http://schemas.openxmlformats.org/drawingml/2006/main" xmlns:r="http://schemas.openxmlformats.org/officeDocument/2006/relationships" xmlns:p="http://schemas.openxmlformats.org/presentationml/2006/main">
   <p:cSld>
     <p:spTree>
@@ -11633,20 +12442,6 @@
               </a:rPr>
               <a:t>2</a:t>
             </a:r>
-            <a:endParaRPr lang="en-CA" dirty="0">
-              <a:ln w="0"/>
-              <a:solidFill>
-                <a:schemeClr val="bg1"/>
-              </a:solidFill>
-              <a:effectLst>
-                <a:outerShdw blurRad="38100" dist="19050" dir="2700000" algn="tl" rotWithShape="0">
-                  <a:schemeClr val="dk1">
-                    <a:alpha val="40000"/>
-                  </a:schemeClr>
-                </a:outerShdw>
-              </a:effectLst>
-              <a:latin typeface="Arial Black" panose="020B0A04020102020204" pitchFamily="34" charset="0"/>
-            </a:endParaRPr>
           </a:p>
         </p:txBody>
       </p:sp>
@@ -11703,20 +12498,6 @@
               </a:rPr>
               <a:t>3</a:t>
             </a:r>
-            <a:endParaRPr lang="en-CA" dirty="0">
-              <a:ln w="0"/>
-              <a:solidFill>
-                <a:schemeClr val="bg1"/>
-              </a:solidFill>
-              <a:effectLst>
-                <a:outerShdw blurRad="38100" dist="19050" dir="2700000" algn="tl" rotWithShape="0">
-                  <a:schemeClr val="dk1">
-                    <a:alpha val="40000"/>
-                  </a:schemeClr>
-                </a:outerShdw>
-              </a:effectLst>
-              <a:latin typeface="Arial Black" panose="020B0A04020102020204" pitchFamily="34" charset="0"/>
-            </a:endParaRPr>
           </a:p>
         </p:txBody>
       </p:sp>
@@ -11733,7 +12514,7 @@
 </p:sld>
 </file>
 
-<file path=ppt/slides/slide23.xml><?xml version="1.0" encoding="utf-8"?>
+<file path=ppt/slides/slide24.xml><?xml version="1.0" encoding="utf-8"?>
 <p:sld xmlns:a="http://schemas.openxmlformats.org/drawingml/2006/main" xmlns:r="http://schemas.openxmlformats.org/officeDocument/2006/relationships" xmlns:p="http://schemas.openxmlformats.org/presentationml/2006/main">
   <p:cSld>
     <p:spTree>
@@ -11767,31 +12548,38 @@
           <a:p>
             <a:r>
               <a:rPr lang="en-CA" dirty="0" smtClean="0"/>
-              <a:t>Rolling back to a previous version</a:t>
+              <a:t>Finding Mistakes with Diff</a:t>
             </a:r>
             <a:endParaRPr lang="en-CA" dirty="0"/>
           </a:p>
         </p:txBody>
       </p:sp>
-      <p:sp>
-        <p:nvSpPr>
-          <p:cNvPr id="3" name="Content Placeholder 2"/>
-          <p:cNvSpPr>
-            <a:spLocks noGrp="1"/>
-          </p:cNvSpPr>
+      <p:pic>
+        <p:nvPicPr>
+          <p:cNvPr id="4" name="Content Placeholder 3"/>
+          <p:cNvPicPr>
+            <a:picLocks noGrp="1" noChangeAspect="1"/>
+          </p:cNvPicPr>
           <p:nvPr>
             <p:ph idx="1"/>
           </p:nvPr>
-        </p:nvSpPr>
-        <p:spPr/>
-        <p:txBody>
-          <a:bodyPr/>
-          <a:lstStyle/>
-          <a:p>
-            <a:endParaRPr lang="en-CA"/>
-          </a:p>
-        </p:txBody>
-      </p:sp>
+        </p:nvPicPr>
+        <p:blipFill>
+          <a:blip r:embed="rId3"/>
+          <a:stretch>
+            <a:fillRect/>
+          </a:stretch>
+        </p:blipFill>
+        <p:spPr>
+          <a:xfrm>
+            <a:off x="838200" y="1690688"/>
+            <a:ext cx="9225095" cy="3599657"/>
+          </a:xfrm>
+          <a:prstGeom prst="rect">
+            <a:avLst/>
+          </a:prstGeom>
+        </p:spPr>
+      </p:pic>
     </p:spTree>
     <p:extLst>
       <p:ext uri="{BB962C8B-B14F-4D97-AF65-F5344CB8AC3E}">
@@ -11805,7 +12593,260 @@
 </p:sld>
 </file>
 
-<file path=ppt/slides/slide24.xml><?xml version="1.0" encoding="utf-8"?>
+<file path=ppt/slides/slide25.xml><?xml version="1.0" encoding="utf-8"?>
+<p:sld xmlns:a="http://schemas.openxmlformats.org/drawingml/2006/main" xmlns:r="http://schemas.openxmlformats.org/officeDocument/2006/relationships" xmlns:p="http://schemas.openxmlformats.org/presentationml/2006/main">
+  <p:cSld>
+    <p:spTree>
+      <p:nvGrpSpPr>
+        <p:cNvPr id="1" name=""/>
+        <p:cNvGrpSpPr/>
+        <p:nvPr/>
+      </p:nvGrpSpPr>
+      <p:grpSpPr>
+        <a:xfrm>
+          <a:off x="0" y="0"/>
+          <a:ext cx="0" cy="0"/>
+          <a:chOff x="0" y="0"/>
+          <a:chExt cx="0" cy="0"/>
+        </a:xfrm>
+      </p:grpSpPr>
+      <p:sp>
+        <p:nvSpPr>
+          <p:cNvPr id="2" name="Title 1"/>
+          <p:cNvSpPr>
+            <a:spLocks noGrp="1"/>
+          </p:cNvSpPr>
+          <p:nvPr>
+            <p:ph type="title"/>
+          </p:nvPr>
+        </p:nvSpPr>
+        <p:spPr/>
+        <p:txBody>
+          <a:bodyPr/>
+          <a:lstStyle/>
+          <a:p>
+            <a:r>
+              <a:rPr lang="en-CA" dirty="0" smtClean="0"/>
+              <a:t>Fixing Mistakes with checkout</a:t>
+            </a:r>
+            <a:endParaRPr lang="en-CA" dirty="0"/>
+          </a:p>
+        </p:txBody>
+      </p:sp>
+      <p:pic>
+        <p:nvPicPr>
+          <p:cNvPr id="5" name="Content Placeholder 4"/>
+          <p:cNvPicPr>
+            <a:picLocks noGrp="1" noChangeAspect="1"/>
+          </p:cNvPicPr>
+          <p:nvPr>
+            <p:ph idx="1"/>
+          </p:nvPr>
+        </p:nvPicPr>
+        <p:blipFill>
+          <a:blip r:embed="rId3"/>
+          <a:stretch>
+            <a:fillRect/>
+          </a:stretch>
+        </p:blipFill>
+        <p:spPr>
+          <a:xfrm>
+            <a:off x="838200" y="3476254"/>
+            <a:ext cx="9610725" cy="1292198"/>
+          </a:xfrm>
+          <a:prstGeom prst="rect">
+            <a:avLst/>
+          </a:prstGeom>
+        </p:spPr>
+      </p:pic>
+      <p:pic>
+        <p:nvPicPr>
+          <p:cNvPr id="6" name="Picture 5"/>
+          <p:cNvPicPr>
+            <a:picLocks noChangeAspect="1"/>
+          </p:cNvPicPr>
+          <p:nvPr/>
+        </p:nvPicPr>
+        <p:blipFill>
+          <a:blip r:embed="rId4"/>
+          <a:stretch>
+            <a:fillRect/>
+          </a:stretch>
+        </p:blipFill>
+        <p:spPr>
+          <a:xfrm>
+            <a:off x="852488" y="4974682"/>
+            <a:ext cx="7315777" cy="1579336"/>
+          </a:xfrm>
+          <a:prstGeom prst="rect">
+            <a:avLst/>
+          </a:prstGeom>
+        </p:spPr>
+      </p:pic>
+      <p:pic>
+        <p:nvPicPr>
+          <p:cNvPr id="7" name="Picture 6"/>
+          <p:cNvPicPr>
+            <a:picLocks noChangeAspect="1"/>
+          </p:cNvPicPr>
+          <p:nvPr/>
+        </p:nvPicPr>
+        <p:blipFill>
+          <a:blip r:embed="rId5"/>
+          <a:stretch>
+            <a:fillRect/>
+          </a:stretch>
+        </p:blipFill>
+        <p:spPr>
+          <a:xfrm>
+            <a:off x="838200" y="1659321"/>
+            <a:ext cx="7388604" cy="1641912"/>
+          </a:xfrm>
+          <a:prstGeom prst="rect">
+            <a:avLst/>
+          </a:prstGeom>
+        </p:spPr>
+      </p:pic>
+      <p:cxnSp>
+        <p:nvCxnSpPr>
+          <p:cNvPr id="11" name="Straight Arrow Connector 10"/>
+          <p:cNvCxnSpPr/>
+          <p:nvPr/>
+        </p:nvCxnSpPr>
+        <p:spPr>
+          <a:xfrm flipH="1">
+            <a:off x="8343900" y="2100263"/>
+            <a:ext cx="514350" cy="380014"/>
+          </a:xfrm>
+          <a:prstGeom prst="straightConnector1">
+            <a:avLst/>
+          </a:prstGeom>
+          <a:ln>
+            <a:tailEnd type="triangle"/>
+          </a:ln>
+        </p:spPr>
+        <p:style>
+          <a:lnRef idx="1">
+            <a:schemeClr val="accent1"/>
+          </a:lnRef>
+          <a:fillRef idx="0">
+            <a:schemeClr val="accent1"/>
+          </a:fillRef>
+          <a:effectRef idx="0">
+            <a:schemeClr val="accent1"/>
+          </a:effectRef>
+          <a:fontRef idx="minor">
+            <a:schemeClr val="tx1"/>
+          </a:fontRef>
+        </p:style>
+      </p:cxnSp>
+      <p:cxnSp>
+        <p:nvCxnSpPr>
+          <p:cNvPr id="15" name="Straight Arrow Connector 14"/>
+          <p:cNvCxnSpPr/>
+          <p:nvPr/>
+        </p:nvCxnSpPr>
+        <p:spPr>
+          <a:xfrm flipH="1" flipV="1">
+            <a:off x="8226804" y="6015038"/>
+            <a:ext cx="545721" cy="385762"/>
+          </a:xfrm>
+          <a:prstGeom prst="straightConnector1">
+            <a:avLst/>
+          </a:prstGeom>
+          <a:ln>
+            <a:tailEnd type="triangle"/>
+          </a:ln>
+        </p:spPr>
+        <p:style>
+          <a:lnRef idx="1">
+            <a:schemeClr val="accent1"/>
+          </a:lnRef>
+          <a:fillRef idx="0">
+            <a:schemeClr val="accent1"/>
+          </a:fillRef>
+          <a:effectRef idx="0">
+            <a:schemeClr val="accent1"/>
+          </a:effectRef>
+          <a:fontRef idx="minor">
+            <a:schemeClr val="tx1"/>
+          </a:fontRef>
+        </p:style>
+      </p:cxnSp>
+      <p:sp>
+        <p:nvSpPr>
+          <p:cNvPr id="16" name="TextBox 15"/>
+          <p:cNvSpPr txBox="1"/>
+          <p:nvPr/>
+        </p:nvSpPr>
+        <p:spPr>
+          <a:xfrm>
+            <a:off x="8858250" y="1876464"/>
+            <a:ext cx="1465145" cy="369332"/>
+          </a:xfrm>
+          <a:prstGeom prst="rect">
+            <a:avLst/>
+          </a:prstGeom>
+          <a:noFill/>
+        </p:spPr>
+        <p:txBody>
+          <a:bodyPr wrap="none" rtlCol="0">
+            <a:spAutoFit/>
+          </a:bodyPr>
+          <a:lstStyle/>
+          <a:p>
+            <a:r>
+              <a:rPr lang="en-CA" dirty="0" smtClean="0"/>
+              <a:t>No semicolon</a:t>
+            </a:r>
+            <a:endParaRPr lang="en-CA" dirty="0"/>
+          </a:p>
+        </p:txBody>
+      </p:sp>
+      <p:sp>
+        <p:nvSpPr>
+          <p:cNvPr id="17" name="TextBox 16"/>
+          <p:cNvSpPr txBox="1"/>
+          <p:nvPr/>
+        </p:nvSpPr>
+        <p:spPr>
+          <a:xfrm>
+            <a:off x="8772525" y="6236494"/>
+            <a:ext cx="2051011" cy="369332"/>
+          </a:xfrm>
+          <a:prstGeom prst="rect">
+            <a:avLst/>
+          </a:prstGeom>
+          <a:noFill/>
+        </p:spPr>
+        <p:txBody>
+          <a:bodyPr wrap="none" rtlCol="0">
+            <a:spAutoFit/>
+          </a:bodyPr>
+          <a:lstStyle/>
+          <a:p>
+            <a:r>
+              <a:rPr lang="en-CA" dirty="0" smtClean="0"/>
+              <a:t>Replaced semicolon</a:t>
+            </a:r>
+            <a:endParaRPr lang="en-CA" dirty="0"/>
+          </a:p>
+        </p:txBody>
+      </p:sp>
+    </p:spTree>
+    <p:extLst>
+      <p:ext uri="{BB962C8B-B14F-4D97-AF65-F5344CB8AC3E}">
+        <p14:creationId xmlns:p14="http://schemas.microsoft.com/office/powerpoint/2010/main" val="3212479910"/>
+      </p:ext>
+    </p:extLst>
+  </p:cSld>
+  <p:clrMapOvr>
+    <a:masterClrMapping/>
+  </p:clrMapOvr>
+</p:sld>
+</file>
+
+<file path=ppt/slides/slide26.xml><?xml version="1.0" encoding="utf-8"?>
 <p:sld xmlns:a="http://schemas.openxmlformats.org/drawingml/2006/main" xmlns:r="http://schemas.openxmlformats.org/officeDocument/2006/relationships" xmlns:p="http://schemas.openxmlformats.org/presentationml/2006/main">
   <p:cSld>
     <p:spTree>
@@ -12068,7 +13109,7 @@
 </p:sld>
 </file>
 
-<file path=ppt/slides/slide25.xml><?xml version="1.0" encoding="utf-8"?>
+<file path=ppt/slides/slide27.xml><?xml version="1.0" encoding="utf-8"?>
 <p:sld xmlns:a="http://schemas.openxmlformats.org/drawingml/2006/main" xmlns:r="http://schemas.openxmlformats.org/officeDocument/2006/relationships" xmlns:p="http://schemas.openxmlformats.org/presentationml/2006/main">
   <p:cSld>
     <p:spTree>
@@ -12477,7 +13518,7 @@
 </p:sld>
 </file>
 
-<file path=ppt/slides/slide26.xml><?xml version="1.0" encoding="utf-8"?>
+<file path=ppt/slides/slide28.xml><?xml version="1.0" encoding="utf-8"?>
 <p:sld xmlns:a="http://schemas.openxmlformats.org/drawingml/2006/main" xmlns:r="http://schemas.openxmlformats.org/officeDocument/2006/relationships" xmlns:p="http://schemas.openxmlformats.org/presentationml/2006/main">
   <p:cSld>
     <p:spTree>
@@ -12559,7 +13600,7 @@
 </p:sld>
 </file>
 
-<file path=ppt/slides/slide27.xml><?xml version="1.0" encoding="utf-8"?>
+<file path=ppt/slides/slide29.xml><?xml version="1.0" encoding="utf-8"?>
 <p:sld xmlns:a="http://schemas.openxmlformats.org/drawingml/2006/main" xmlns:r="http://schemas.openxmlformats.org/officeDocument/2006/relationships" xmlns:p="http://schemas.openxmlformats.org/presentationml/2006/main">
   <p:cSld>
     <p:spTree>
@@ -12593,7 +13634,7 @@
           <a:p>
             <a:r>
               <a:rPr lang="en-CA" dirty="0" smtClean="0"/>
-              <a:t>Extra Credits</a:t>
+              <a:t>Extra Credit</a:t>
             </a:r>
             <a:endParaRPr lang="en-CA" dirty="0"/>
           </a:p>
@@ -12619,20 +13660,27 @@
               <a:buAutoNum type="arabicPeriod"/>
             </a:pPr>
             <a:r>
+              <a:rPr lang="en-CA" dirty="0" smtClean="0"/>
+              <a:t>Try </a:t>
+            </a:r>
+            <a:r>
               <a:rPr lang="en-CA" dirty="0" err="1" smtClean="0"/>
-              <a:t>Vogella</a:t>
+              <a:t>github</a:t>
             </a:r>
             <a:r>
               <a:rPr lang="en-CA" dirty="0" smtClean="0"/>
-              <a:t> Reference: </a:t>
-            </a:r>
-            <a:r>
-              <a:rPr lang="en-CA" dirty="0">
-                <a:hlinkClick r:id="rId3"/>
+              <a:t> Interactive Tutorial: </a:t>
+            </a:r>
+            <a:r>
+              <a:rPr lang="en-CA" dirty="0" smtClean="0">
+                <a:hlinkClick r:id="rId2"/>
               </a:rPr>
-              <a:t>http://www.vogella.com/tutorials/Git/article.html</a:t>
-            </a:r>
-            <a:endParaRPr lang="en-CA" dirty="0"/>
+              <a:t>https://try.github.io/levels/1/challenges/1</a:t>
+            </a:r>
+            <a:r>
+              <a:rPr lang="en-CA" dirty="0" smtClean="0"/>
+              <a:t> </a:t>
+            </a:r>
           </a:p>
           <a:p>
             <a:pPr marL="457200" indent="-457200">
@@ -12641,27 +13689,13 @@
             </a:pPr>
             <a:r>
               <a:rPr lang="en-CA" dirty="0" smtClean="0"/>
-              <a:t>Try </a:t>
-            </a:r>
-            <a:r>
-              <a:rPr lang="en-CA" dirty="0" err="1" smtClean="0"/>
-              <a:t>github</a:t>
-            </a:r>
-            <a:r>
-              <a:rPr lang="en-CA" dirty="0"/>
-              <a:t> Interactive Tutorial: </a:t>
-            </a:r>
-            <a:r>
-              <a:rPr lang="en-CA" dirty="0">
-                <a:hlinkClick r:id="rId4"/>
+              <a:t>Visual Explanation: </a:t>
+            </a:r>
+            <a:r>
+              <a:rPr lang="en-CA" dirty="0" smtClean="0">
+                <a:hlinkClick r:id="rId3"/>
               </a:rPr>
-              <a:t>https://</a:t>
-            </a:r>
-            <a:r>
-              <a:rPr lang="en-CA" dirty="0" smtClean="0">
-                <a:hlinkClick r:id="rId4"/>
-              </a:rPr>
-              <a:t>try.github.io/levels/1/challenges/1</a:t>
+              <a:t>http://www.wei-wang.com/ExplainGitWithD3/</a:t>
             </a:r>
             <a:r>
               <a:rPr lang="en-CA" dirty="0" smtClean="0"/>
@@ -12669,83 +13703,23 @@
             </a:r>
           </a:p>
           <a:p>
-            <a:pPr marL="457200" indent="-457200">
-              <a:buFont typeface="+mj-lt"/>
-              <a:buAutoNum type="arabicPeriod"/>
+            <a:pPr marL="0" indent="0">
+              <a:buNone/>
             </a:pPr>
-            <a:r>
-              <a:rPr lang="en-CA" dirty="0" smtClean="0"/>
-              <a:t>Visual Explanation: </a:t>
-            </a:r>
-            <a:r>
-              <a:rPr lang="en-CA" dirty="0">
-                <a:hlinkClick r:id="rId5"/>
-              </a:rPr>
-              <a:t>http://www.wei-wang.com/ExplainGitWithD3</a:t>
-            </a:r>
-            <a:r>
-              <a:rPr lang="en-CA" dirty="0" smtClean="0">
-                <a:hlinkClick r:id="rId5"/>
-              </a:rPr>
-              <a:t>/</a:t>
-            </a:r>
-            <a:r>
-              <a:rPr lang="en-CA" dirty="0" smtClean="0"/>
-              <a:t> </a:t>
-            </a:r>
-          </a:p>
-          <a:p>
-            <a:pPr marL="457200" indent="-457200">
-              <a:buFont typeface="+mj-lt"/>
-              <a:buAutoNum type="arabicPeriod"/>
-            </a:pPr>
-            <a:r>
-              <a:rPr lang="en-CA" dirty="0" smtClean="0"/>
-              <a:t>SSH </a:t>
-            </a:r>
-            <a:r>
-              <a:rPr lang="en-CA" dirty="0"/>
-              <a:t>keys tutorial: </a:t>
-            </a:r>
-            <a:r>
-              <a:rPr lang="en-CA" dirty="0">
-                <a:hlinkClick r:id="rId6"/>
-              </a:rPr>
-              <a:t>https://</a:t>
-            </a:r>
-            <a:r>
-              <a:rPr lang="en-CA" dirty="0" smtClean="0">
-                <a:hlinkClick r:id="rId6"/>
-              </a:rPr>
-              <a:t>help.github.com/articles/generating-ssh-keys</a:t>
-            </a:r>
-            <a:r>
-              <a:rPr lang="en-CA" dirty="0" smtClean="0"/>
-              <a:t> 	</a:t>
-            </a:r>
-          </a:p>
-          <a:p>
-            <a:endParaRPr lang="en-CA" dirty="0" smtClean="0"/>
+            <a:endParaRPr lang="en-CA" dirty="0"/>
           </a:p>
         </p:txBody>
       </p:sp>
     </p:spTree>
     <p:extLst>
       <p:ext uri="{BB962C8B-B14F-4D97-AF65-F5344CB8AC3E}">
-        <p14:creationId xmlns:p14="http://schemas.microsoft.com/office/powerpoint/2010/main" val="2799393739"/>
+        <p14:creationId xmlns:p14="http://schemas.microsoft.com/office/powerpoint/2010/main" val="2837122562"/>
       </p:ext>
     </p:extLst>
   </p:cSld>
   <p:clrMapOvr>
     <a:masterClrMapping/>
   </p:clrMapOvr>
-  <p:timing>
-    <p:tnLst>
-      <p:par>
-        <p:cTn id="1" dur="indefinite" restart="never" nodeType="tmRoot"/>
-      </p:par>
-    </p:tnLst>
-  </p:timing>
 </p:sld>
 </file>
 
@@ -12782,10 +13756,14 @@
           <a:lstStyle/>
           <a:p>
             <a:r>
-              <a:rPr lang="en-CA" dirty="0" smtClean="0"/>
-              <a:t>Pop Quiz</a:t>
-            </a:r>
-            <a:endParaRPr lang="en-CA" dirty="0"/>
+              <a:rPr lang="en-US" dirty="0"/>
+              <a:t>What is </a:t>
+            </a:r>
+            <a:r>
+              <a:rPr lang="en-US" dirty="0" smtClean="0"/>
+              <a:t>Version Control?</a:t>
+            </a:r>
+            <a:endParaRPr lang="en-US" dirty="0"/>
           </a:p>
         </p:txBody>
       </p:sp>
@@ -12805,29 +13783,261 @@
           <a:lstStyle/>
           <a:p>
             <a:r>
-              <a:rPr lang="en-CA" dirty="0" smtClean="0"/>
-              <a:t>Would it be a good idea to use version control on your photo album?</a:t>
-            </a:r>
-          </a:p>
-          <a:p>
-            <a:r>
-              <a:rPr lang="en-CA" dirty="0" smtClean="0"/>
-              <a:t>When would you want to revert to a previous version of a file?</a:t>
-            </a:r>
-          </a:p>
-          <a:p>
-            <a:r>
-              <a:rPr lang="en-CA" dirty="0" smtClean="0"/>
-              <a:t>Why would you want to branch your files?</a:t>
-            </a:r>
-            <a:endParaRPr lang="en-CA" dirty="0"/>
-          </a:p>
-        </p:txBody>
-      </p:sp>
+              <a:rPr lang="en-US" dirty="0" smtClean="0"/>
+              <a:t>Version Control software is a tool used to keep track of different versions of files</a:t>
+            </a:r>
+          </a:p>
+          <a:p>
+            <a:r>
+              <a:rPr lang="en-US" dirty="0" smtClean="0"/>
+              <a:t>Revert to an old version</a:t>
+            </a:r>
+          </a:p>
+          <a:p>
+            <a:r>
+              <a:rPr lang="en-US" dirty="0" smtClean="0"/>
+              <a:t>Branch to create multiple </a:t>
+            </a:r>
+            <a:r>
+              <a:rPr lang="en-US" dirty="0" smtClean="0"/>
+              <a:t>versions</a:t>
+            </a:r>
+            <a:endParaRPr lang="en-US" dirty="0" smtClean="0"/>
+          </a:p>
+          <a:p>
+            <a:r>
+              <a:rPr lang="en-US" dirty="0" smtClean="0"/>
+              <a:t>Merge two different versions together</a:t>
+            </a:r>
+          </a:p>
+          <a:p>
+            <a:r>
+              <a:rPr lang="en-US" dirty="0" smtClean="0"/>
+              <a:t>Synchronize files on different </a:t>
+            </a:r>
+            <a:r>
+              <a:rPr lang="en-US" dirty="0" smtClean="0"/>
+              <a:t>machines</a:t>
+            </a:r>
+          </a:p>
+        </p:txBody>
+      </p:sp>
+      <p:pic>
+        <p:nvPicPr>
+          <p:cNvPr id="4" name="Picture 3"/>
+          <p:cNvPicPr>
+            <a:picLocks noChangeAspect="1"/>
+          </p:cNvPicPr>
+          <p:nvPr/>
+        </p:nvPicPr>
+        <p:blipFill>
+          <a:blip r:embed="rId3">
+            <a:extLst>
+              <a:ext uri="{28A0092B-C50C-407E-A947-70E740481C1C}">
+                <a14:useLocalDpi xmlns:a14="http://schemas.microsoft.com/office/drawing/2010/main" val="0"/>
+              </a:ext>
+            </a:extLst>
+          </a:blip>
+          <a:stretch>
+            <a:fillRect/>
+          </a:stretch>
+        </p:blipFill>
+        <p:spPr>
+          <a:xfrm>
+            <a:off x="8903289" y="4099969"/>
+            <a:ext cx="1214846" cy="2076994"/>
+          </a:xfrm>
+          <a:prstGeom prst="rect">
+            <a:avLst/>
+          </a:prstGeom>
+        </p:spPr>
+      </p:pic>
     </p:spTree>
     <p:extLst>
       <p:ext uri="{BB962C8B-B14F-4D97-AF65-F5344CB8AC3E}">
-        <p14:creationId xmlns:p14="http://schemas.microsoft.com/office/powerpoint/2010/main" val="3257195443"/>
+        <p14:creationId xmlns:p14="http://schemas.microsoft.com/office/powerpoint/2010/main" val="3392569427"/>
+      </p:ext>
+    </p:extLst>
+  </p:cSld>
+  <p:clrMapOvr>
+    <a:masterClrMapping/>
+  </p:clrMapOvr>
+  <p:timing>
+    <p:tnLst>
+      <p:par>
+        <p:cTn id="1" dur="indefinite" restart="never" nodeType="tmRoot"/>
+      </p:par>
+    </p:tnLst>
+  </p:timing>
+</p:sld>
+</file>
+
+<file path=ppt/slides/slide30.xml><?xml version="1.0" encoding="utf-8"?>
+<p:sld xmlns:a="http://schemas.openxmlformats.org/drawingml/2006/main" xmlns:r="http://schemas.openxmlformats.org/officeDocument/2006/relationships" xmlns:p="http://schemas.openxmlformats.org/presentationml/2006/main">
+  <p:cSld>
+    <p:spTree>
+      <p:nvGrpSpPr>
+        <p:cNvPr id="1" name=""/>
+        <p:cNvGrpSpPr/>
+        <p:nvPr/>
+      </p:nvGrpSpPr>
+      <p:grpSpPr>
+        <a:xfrm>
+          <a:off x="0" y="0"/>
+          <a:ext cx="0" cy="0"/>
+          <a:chOff x="0" y="0"/>
+          <a:chExt cx="0" cy="0"/>
+        </a:xfrm>
+      </p:grpSpPr>
+      <p:sp>
+        <p:nvSpPr>
+          <p:cNvPr id="2" name="Title 1"/>
+          <p:cNvSpPr>
+            <a:spLocks noGrp="1"/>
+          </p:cNvSpPr>
+          <p:nvPr>
+            <p:ph type="title"/>
+          </p:nvPr>
+        </p:nvSpPr>
+        <p:spPr/>
+        <p:txBody>
+          <a:bodyPr/>
+          <a:lstStyle/>
+          <a:p>
+            <a:r>
+              <a:rPr lang="en-CA" dirty="0" smtClean="0"/>
+              <a:t>More resources</a:t>
+            </a:r>
+            <a:endParaRPr lang="en-CA" dirty="0"/>
+          </a:p>
+        </p:txBody>
+      </p:sp>
+      <p:sp>
+        <p:nvSpPr>
+          <p:cNvPr id="3" name="Content Placeholder 2"/>
+          <p:cNvSpPr>
+            <a:spLocks noGrp="1"/>
+          </p:cNvSpPr>
+          <p:nvPr>
+            <p:ph idx="1"/>
+          </p:nvPr>
+        </p:nvSpPr>
+        <p:spPr/>
+        <p:txBody>
+          <a:bodyPr>
+            <a:normAutofit/>
+          </a:bodyPr>
+          <a:lstStyle/>
+          <a:p>
+            <a:pPr marL="457200" indent="-457200">
+              <a:buFont typeface="+mj-lt"/>
+              <a:buAutoNum type="arabicPeriod"/>
+            </a:pPr>
+            <a:r>
+              <a:rPr lang="en-CA" dirty="0" err="1" smtClean="0"/>
+              <a:t>Vogella</a:t>
+            </a:r>
+            <a:r>
+              <a:rPr lang="en-CA" dirty="0" smtClean="0"/>
+              <a:t> Reference: </a:t>
+            </a:r>
+            <a:r>
+              <a:rPr lang="en-CA" dirty="0">
+                <a:hlinkClick r:id="rId3"/>
+              </a:rPr>
+              <a:t>http://www.vogella.com/tutorials/Git/article.html</a:t>
+            </a:r>
+            <a:endParaRPr lang="en-CA" dirty="0"/>
+          </a:p>
+          <a:p>
+            <a:pPr marL="457200" indent="-457200">
+              <a:buFont typeface="+mj-lt"/>
+              <a:buAutoNum type="arabicPeriod"/>
+            </a:pPr>
+            <a:r>
+              <a:rPr lang="en-CA" dirty="0" smtClean="0"/>
+              <a:t>SSH </a:t>
+            </a:r>
+            <a:r>
+              <a:rPr lang="en-CA" dirty="0"/>
+              <a:t>keys tutorial: </a:t>
+            </a:r>
+            <a:r>
+              <a:rPr lang="en-CA" dirty="0">
+                <a:hlinkClick r:id="rId4"/>
+              </a:rPr>
+              <a:t>https://</a:t>
+            </a:r>
+            <a:r>
+              <a:rPr lang="en-CA" dirty="0" smtClean="0">
+                <a:hlinkClick r:id="rId4"/>
+              </a:rPr>
+              <a:t>help.github.com/articles/generating-ssh-keys</a:t>
+            </a:r>
+            <a:r>
+              <a:rPr lang="en-CA" dirty="0" smtClean="0"/>
+              <a:t> 	</a:t>
+            </a:r>
+            <a:endParaRPr lang="en-CA" dirty="0" smtClean="0"/>
+          </a:p>
+          <a:p>
+            <a:pPr marL="457200" indent="-457200">
+              <a:buFont typeface="+mj-lt"/>
+              <a:buAutoNum type="arabicPeriod"/>
+            </a:pPr>
+            <a:r>
+              <a:rPr lang="en-CA" dirty="0" smtClean="0"/>
+              <a:t>Git </a:t>
+            </a:r>
+            <a:r>
+              <a:rPr lang="en-CA" dirty="0" err="1" smtClean="0"/>
+              <a:t>Cheetsheet</a:t>
+            </a:r>
+            <a:r>
+              <a:rPr lang="en-CA" dirty="0" smtClean="0"/>
+              <a:t>: </a:t>
+            </a:r>
+            <a:r>
+              <a:rPr lang="en-CA" dirty="0" smtClean="0">
+                <a:hlinkClick r:id="rId5"/>
+              </a:rPr>
+              <a:t>https://raw.githubusercontent.com/nerdgirl/git-cheatsheet-visual/master/gitcheatsheet.png</a:t>
+            </a:r>
+            <a:r>
+              <a:rPr lang="en-CA" dirty="0" smtClean="0"/>
+              <a:t> </a:t>
+            </a:r>
+          </a:p>
+          <a:p>
+            <a:pPr marL="457200" indent="-457200">
+              <a:buFont typeface="+mj-lt"/>
+              <a:buAutoNum type="arabicPeriod"/>
+            </a:pPr>
+            <a:r>
+              <a:rPr lang="en-CA" dirty="0" smtClean="0"/>
+              <a:t>Dominic’s Tutorial slides: </a:t>
+            </a:r>
+            <a:r>
+              <a:rPr lang="en-CA" dirty="0" smtClean="0">
+                <a:hlinkClick r:id="rId6"/>
+              </a:rPr>
+              <a:t>http://slides.com/dominiccharleyroy/tutorial-1-git#/</a:t>
+            </a:r>
+            <a:r>
+              <a:rPr lang="en-CA" dirty="0" smtClean="0"/>
+              <a:t> </a:t>
+            </a:r>
+            <a:endParaRPr lang="en-CA" dirty="0" smtClean="0"/>
+          </a:p>
+          <a:p>
+            <a:endParaRPr lang="en-CA" dirty="0" smtClean="0"/>
+          </a:p>
+        </p:txBody>
+      </p:sp>
+    </p:spTree>
+    <p:extLst>
+      <p:ext uri="{BB962C8B-B14F-4D97-AF65-F5344CB8AC3E}">
+        <p14:creationId xmlns:p14="http://schemas.microsoft.com/office/powerpoint/2010/main" val="2799393739"/>
       </p:ext>
     </p:extLst>
   </p:cSld>
@@ -12877,9 +14087,10 @@
           <a:lstStyle/>
           <a:p>
             <a:r>
-              <a:rPr lang="en-US"/>
-              <a:t>Why You're going to use it</a:t>
-            </a:r>
+              <a:rPr lang="en-CA" dirty="0" smtClean="0"/>
+              <a:t>Pop Quiz</a:t>
+            </a:r>
+            <a:endParaRPr lang="en-CA" dirty="0"/>
           </a:p>
         </p:txBody>
       </p:sp>
@@ -12899,39 +14110,29 @@
           <a:lstStyle/>
           <a:p>
             <a:r>
-              <a:rPr lang="en-US" dirty="0" smtClean="0"/>
-              <a:t>You need it for this class</a:t>
-            </a:r>
-          </a:p>
-          <a:p>
-            <a:r>
-              <a:rPr lang="en-US" dirty="0" smtClean="0"/>
-              <a:t>It’s a great way to sync your code with your team</a:t>
-            </a:r>
-          </a:p>
-          <a:p>
-            <a:r>
-              <a:rPr lang="en-US" dirty="0" smtClean="0"/>
-              <a:t>Because using </a:t>
-            </a:r>
-            <a:r>
-              <a:rPr lang="en-US" dirty="0" err="1" smtClean="0"/>
-              <a:t>dropbox</a:t>
-            </a:r>
-            <a:r>
-              <a:rPr lang="en-US" dirty="0" smtClean="0"/>
-              <a:t> to sync your code is so last semester</a:t>
-            </a:r>
-          </a:p>
-          <a:p>
-            <a:endParaRPr lang="en-US" dirty="0"/>
+              <a:rPr lang="en-CA" dirty="0" smtClean="0"/>
+              <a:t>Would it be a good idea to use version control on your photo album?</a:t>
+            </a:r>
+          </a:p>
+          <a:p>
+            <a:r>
+              <a:rPr lang="en-CA" dirty="0" smtClean="0"/>
+              <a:t>When would you want to revert to a previous version of a file?</a:t>
+            </a:r>
+          </a:p>
+          <a:p>
+            <a:r>
+              <a:rPr lang="en-CA" dirty="0" smtClean="0"/>
+              <a:t>Why would you want to branch your files?</a:t>
+            </a:r>
+            <a:endParaRPr lang="en-CA" dirty="0"/>
           </a:p>
         </p:txBody>
       </p:sp>
     </p:spTree>
     <p:extLst>
       <p:ext uri="{BB962C8B-B14F-4D97-AF65-F5344CB8AC3E}">
-        <p14:creationId xmlns:p14="http://schemas.microsoft.com/office/powerpoint/2010/main" val="1436895422"/>
+        <p14:creationId xmlns:p14="http://schemas.microsoft.com/office/powerpoint/2010/main" val="3257195443"/>
       </p:ext>
     </p:extLst>
   </p:cSld>
@@ -12981,6 +14182,114 @@
           <a:lstStyle/>
           <a:p>
             <a:r>
+              <a:rPr lang="en-US"/>
+              <a:t>Why You're going to use it</a:t>
+            </a:r>
+          </a:p>
+        </p:txBody>
+      </p:sp>
+      <p:sp>
+        <p:nvSpPr>
+          <p:cNvPr id="3" name="Content Placeholder 2"/>
+          <p:cNvSpPr>
+            <a:spLocks noGrp="1"/>
+          </p:cNvSpPr>
+          <p:nvPr>
+            <p:ph idx="1"/>
+          </p:nvPr>
+        </p:nvSpPr>
+        <p:spPr/>
+        <p:txBody>
+          <a:bodyPr/>
+          <a:lstStyle/>
+          <a:p>
+            <a:r>
+              <a:rPr lang="en-US" dirty="0" smtClean="0"/>
+              <a:t>You need it for this class</a:t>
+            </a:r>
+          </a:p>
+          <a:p>
+            <a:r>
+              <a:rPr lang="en-US" dirty="0" smtClean="0"/>
+              <a:t>It’s a great way to sync your code with your team</a:t>
+            </a:r>
+          </a:p>
+          <a:p>
+            <a:r>
+              <a:rPr lang="en-US" dirty="0" smtClean="0"/>
+              <a:t>Because using </a:t>
+            </a:r>
+            <a:r>
+              <a:rPr lang="en-US" dirty="0" err="1" smtClean="0"/>
+              <a:t>dropbox</a:t>
+            </a:r>
+            <a:r>
+              <a:rPr lang="en-US" dirty="0" smtClean="0"/>
+              <a:t> to sync your code is </a:t>
+            </a:r>
+            <a:r>
+              <a:rPr lang="en-US" u="sng" dirty="0" smtClean="0"/>
+              <a:t>so last semester</a:t>
+            </a:r>
+          </a:p>
+          <a:p>
+            <a:endParaRPr lang="en-US" dirty="0"/>
+          </a:p>
+        </p:txBody>
+      </p:sp>
+    </p:spTree>
+    <p:extLst>
+      <p:ext uri="{BB962C8B-B14F-4D97-AF65-F5344CB8AC3E}">
+        <p14:creationId xmlns:p14="http://schemas.microsoft.com/office/powerpoint/2010/main" val="1436895422"/>
+      </p:ext>
+    </p:extLst>
+  </p:cSld>
+  <p:clrMapOvr>
+    <a:masterClrMapping/>
+  </p:clrMapOvr>
+  <p:timing>
+    <p:tnLst>
+      <p:par>
+        <p:cTn id="1" dur="indefinite" restart="never" nodeType="tmRoot"/>
+      </p:par>
+    </p:tnLst>
+  </p:timing>
+</p:sld>
+</file>
+
+<file path=ppt/slides/slide6.xml><?xml version="1.0" encoding="utf-8"?>
+<p:sld xmlns:a="http://schemas.openxmlformats.org/drawingml/2006/main" xmlns:r="http://schemas.openxmlformats.org/officeDocument/2006/relationships" xmlns:p="http://schemas.openxmlformats.org/presentationml/2006/main">
+  <p:cSld>
+    <p:spTree>
+      <p:nvGrpSpPr>
+        <p:cNvPr id="1" name=""/>
+        <p:cNvGrpSpPr/>
+        <p:nvPr/>
+      </p:nvGrpSpPr>
+      <p:grpSpPr>
+        <a:xfrm>
+          <a:off x="0" y="0"/>
+          <a:ext cx="0" cy="0"/>
+          <a:chOff x="0" y="0"/>
+          <a:chExt cx="0" cy="0"/>
+        </a:xfrm>
+      </p:grpSpPr>
+      <p:sp>
+        <p:nvSpPr>
+          <p:cNvPr id="2" name="Title 1"/>
+          <p:cNvSpPr>
+            <a:spLocks noGrp="1"/>
+          </p:cNvSpPr>
+          <p:nvPr>
+            <p:ph type="title"/>
+          </p:nvPr>
+        </p:nvSpPr>
+        <p:spPr/>
+        <p:txBody>
+          <a:bodyPr/>
+          <a:lstStyle/>
+          <a:p>
+            <a:r>
               <a:rPr lang="en-US" dirty="0" smtClean="0"/>
               <a:t>Let get </a:t>
             </a:r>
@@ -13002,7 +14311,7 @@
             <p:ph idx="1"/>
             <p:extLst>
               <p:ext uri="{D42A27DB-BD31-4B8C-83A1-F6EECF244321}">
-                <p14:modId xmlns:p14="http://schemas.microsoft.com/office/powerpoint/2010/main" val="3055511752"/>
+                <p14:modId xmlns:p14="http://schemas.microsoft.com/office/powerpoint/2010/main" val="2368711125"/>
               </p:ext>
             </p:extLst>
           </p:nvPr>
@@ -13037,7 +14346,7 @@
 </p:sld>
 </file>
 
-<file path=ppt/slides/slide6.xml><?xml version="1.0" encoding="utf-8"?>
+<file path=ppt/slides/slide7.xml><?xml version="1.0" encoding="utf-8"?>
 <p:sld xmlns:a="http://schemas.openxmlformats.org/drawingml/2006/main" xmlns:r="http://schemas.openxmlformats.org/officeDocument/2006/relationships" xmlns:p="http://schemas.openxmlformats.org/presentationml/2006/main">
   <p:cSld>
     <p:spTree>
@@ -13483,7 +14792,7 @@
 </p:sld>
 </file>
 
-<file path=ppt/slides/slide7.xml><?xml version="1.0" encoding="utf-8"?>
+<file path=ppt/slides/slide8.xml><?xml version="1.0" encoding="utf-8"?>
 <p:sld xmlns:a="http://schemas.openxmlformats.org/drawingml/2006/main" xmlns:r="http://schemas.openxmlformats.org/officeDocument/2006/relationships" xmlns:p="http://schemas.openxmlformats.org/presentationml/2006/main">
   <p:cSld>
     <p:spTree>
@@ -13517,15 +14826,238 @@
           <a:p>
             <a:r>
               <a:rPr lang="en-CA" dirty="0" smtClean="0"/>
-              <a:t>Making git work with GitHub (</a:t>
-            </a:r>
-            <a:r>
-              <a:rPr lang="en-CA" dirty="0" err="1" smtClean="0"/>
-              <a:t>ssh</a:t>
+              <a:t>Making git work with GitHub </a:t>
+            </a:r>
+            <a:endParaRPr lang="en-CA" dirty="0"/>
+          </a:p>
+        </p:txBody>
+      </p:sp>
+      <p:pic>
+        <p:nvPicPr>
+          <p:cNvPr id="4" name="Content Placeholder 3"/>
+          <p:cNvPicPr>
+            <a:picLocks noGrp="1" noChangeAspect="1"/>
+          </p:cNvPicPr>
+          <p:nvPr>
+            <p:ph idx="1"/>
+          </p:nvPr>
+        </p:nvPicPr>
+        <p:blipFill>
+          <a:blip r:embed="rId3"/>
+          <a:stretch>
+            <a:fillRect/>
+          </a:stretch>
+        </p:blipFill>
+        <p:spPr>
+          <a:xfrm>
+            <a:off x="838200" y="2034381"/>
+            <a:ext cx="8966422" cy="994569"/>
+          </a:xfrm>
+          <a:prstGeom prst="rect">
+            <a:avLst/>
+          </a:prstGeom>
+        </p:spPr>
+      </p:pic>
+      <p:pic>
+        <p:nvPicPr>
+          <p:cNvPr id="5" name="Picture 4"/>
+          <p:cNvPicPr>
+            <a:picLocks noChangeAspect="1"/>
+          </p:cNvPicPr>
+          <p:nvPr/>
+        </p:nvPicPr>
+        <p:blipFill>
+          <a:blip r:embed="rId4"/>
+          <a:stretch>
+            <a:fillRect/>
+          </a:stretch>
+        </p:blipFill>
+        <p:spPr>
+          <a:xfrm>
+            <a:off x="838200" y="3711574"/>
+            <a:ext cx="8966422" cy="994569"/>
+          </a:xfrm>
+          <a:prstGeom prst="rect">
+            <a:avLst/>
+          </a:prstGeom>
+        </p:spPr>
+      </p:pic>
+      <p:sp>
+        <p:nvSpPr>
+          <p:cNvPr id="6" name="Oval 5"/>
+          <p:cNvSpPr/>
+          <p:nvPr/>
+        </p:nvSpPr>
+        <p:spPr>
+          <a:xfrm>
+            <a:off x="414338" y="1758449"/>
+            <a:ext cx="614863" cy="614863"/>
+          </a:xfrm>
+          <a:prstGeom prst="ellipse">
+            <a:avLst/>
+          </a:prstGeom>
+        </p:spPr>
+        <p:style>
+          <a:lnRef idx="2">
+            <a:schemeClr val="accent1">
+              <a:shade val="50000"/>
+            </a:schemeClr>
+          </a:lnRef>
+          <a:fillRef idx="1">
+            <a:schemeClr val="accent1"/>
+          </a:fillRef>
+          <a:effectRef idx="0">
+            <a:schemeClr val="accent1"/>
+          </a:effectRef>
+          <a:fontRef idx="minor">
+            <a:schemeClr val="lt1"/>
+          </a:fontRef>
+        </p:style>
+        <p:txBody>
+          <a:bodyPr rtlCol="0" anchor="ctr"/>
+          <a:lstStyle/>
+          <a:p>
+            <a:pPr algn="ctr"/>
+            <a:r>
+              <a:rPr lang="en-CA" dirty="0" smtClean="0">
+                <a:ln w="0"/>
+                <a:solidFill>
+                  <a:schemeClr val="bg1"/>
+                </a:solidFill>
+                <a:effectLst>
+                  <a:outerShdw blurRad="38100" dist="19050" dir="2700000" algn="tl" rotWithShape="0">
+                    <a:schemeClr val="dk1">
+                      <a:alpha val="40000"/>
+                    </a:schemeClr>
+                  </a:outerShdw>
+                </a:effectLst>
+                <a:latin typeface="Arial Black" panose="020B0A04020102020204" pitchFamily="34" charset="0"/>
+              </a:rPr>
+              <a:t>1</a:t>
+            </a:r>
+            <a:endParaRPr lang="en-CA" dirty="0">
+              <a:ln w="0"/>
+              <a:solidFill>
+                <a:schemeClr val="bg1"/>
+              </a:solidFill>
+              <a:effectLst>
+                <a:outerShdw blurRad="38100" dist="19050" dir="2700000" algn="tl" rotWithShape="0">
+                  <a:schemeClr val="dk1">
+                    <a:alpha val="40000"/>
+                  </a:schemeClr>
+                </a:outerShdw>
+              </a:effectLst>
+              <a:latin typeface="Arial Black" panose="020B0A04020102020204" pitchFamily="34" charset="0"/>
+            </a:endParaRPr>
+          </a:p>
+        </p:txBody>
+      </p:sp>
+      <p:sp>
+        <p:nvSpPr>
+          <p:cNvPr id="7" name="Oval 6"/>
+          <p:cNvSpPr/>
+          <p:nvPr/>
+        </p:nvSpPr>
+        <p:spPr>
+          <a:xfrm>
+            <a:off x="414337" y="3435349"/>
+            <a:ext cx="614863" cy="614863"/>
+          </a:xfrm>
+          <a:prstGeom prst="ellipse">
+            <a:avLst/>
+          </a:prstGeom>
+        </p:spPr>
+        <p:style>
+          <a:lnRef idx="2">
+            <a:schemeClr val="accent1">
+              <a:shade val="50000"/>
+            </a:schemeClr>
+          </a:lnRef>
+          <a:fillRef idx="1">
+            <a:schemeClr val="accent1"/>
+          </a:fillRef>
+          <a:effectRef idx="0">
+            <a:schemeClr val="accent1"/>
+          </a:effectRef>
+          <a:fontRef idx="minor">
+            <a:schemeClr val="lt1"/>
+          </a:fontRef>
+        </p:style>
+        <p:txBody>
+          <a:bodyPr rtlCol="0" anchor="ctr"/>
+          <a:lstStyle/>
+          <a:p>
+            <a:pPr algn="ctr"/>
+            <a:r>
+              <a:rPr lang="en-CA" dirty="0" smtClean="0">
+                <a:ln w="0"/>
+                <a:solidFill>
+                  <a:schemeClr val="bg1"/>
+                </a:solidFill>
+                <a:effectLst>
+                  <a:outerShdw blurRad="38100" dist="19050" dir="2700000" algn="tl" rotWithShape="0">
+                    <a:schemeClr val="dk1">
+                      <a:alpha val="40000"/>
+                    </a:schemeClr>
+                  </a:outerShdw>
+                </a:effectLst>
+                <a:latin typeface="Arial Black" panose="020B0A04020102020204" pitchFamily="34" charset="0"/>
+              </a:rPr>
+              <a:t>2</a:t>
+            </a:r>
+            <a:endParaRPr lang="en-CA" dirty="0">
+              <a:ln w="0"/>
+              <a:solidFill>
+                <a:schemeClr val="bg1"/>
+              </a:solidFill>
+              <a:effectLst>
+                <a:outerShdw blurRad="38100" dist="19050" dir="2700000" algn="tl" rotWithShape="0">
+                  <a:schemeClr val="dk1">
+                    <a:alpha val="40000"/>
+                  </a:schemeClr>
+                </a:outerShdw>
+              </a:effectLst>
+              <a:latin typeface="Arial Black" panose="020B0A04020102020204" pitchFamily="34" charset="0"/>
+            </a:endParaRPr>
+          </a:p>
+        </p:txBody>
+      </p:sp>
+      <p:sp>
+        <p:nvSpPr>
+          <p:cNvPr id="8" name="Rectangle 7"/>
+          <p:cNvSpPr/>
+          <p:nvPr/>
+        </p:nvSpPr>
+        <p:spPr>
+          <a:xfrm>
+            <a:off x="1029200" y="5501758"/>
+            <a:ext cx="5193794" cy="369332"/>
+          </a:xfrm>
+          <a:prstGeom prst="rect">
+            <a:avLst/>
+          </a:prstGeom>
+        </p:spPr>
+        <p:txBody>
+          <a:bodyPr wrap="none">
+            <a:spAutoFit/>
+          </a:bodyPr>
+          <a:lstStyle/>
+          <a:p>
+            <a:r>
+              <a:rPr lang="en-CA" dirty="0">
+                <a:hlinkClick r:id="rId5"/>
+              </a:rPr>
+              <a:t>https://</a:t>
+            </a:r>
+            <a:r>
+              <a:rPr lang="en-CA" dirty="0" smtClean="0">
+                <a:hlinkClick r:id="rId5"/>
+              </a:rPr>
+              <a:t>help.github.com/articles/generating-ssh-keys</a:t>
             </a:r>
             <a:r>
               <a:rPr lang="en-CA" dirty="0" smtClean="0"/>
-              <a:t> keys)</a:t>
+              <a:t> </a:t>
             </a:r>
             <a:endParaRPr lang="en-CA" dirty="0"/>
           </a:p>
@@ -13533,35 +15065,78 @@
       </p:sp>
       <p:sp>
         <p:nvSpPr>
-          <p:cNvPr id="3" name="Content Placeholder 2"/>
-          <p:cNvSpPr>
-            <a:spLocks noGrp="1"/>
-          </p:cNvSpPr>
-          <p:nvPr>
-            <p:ph idx="1"/>
-          </p:nvPr>
-        </p:nvSpPr>
-        <p:spPr/>
-        <p:txBody>
-          <a:bodyPr/>
-          <a:lstStyle/>
-          <a:p>
-            <a:r>
-              <a:rPr lang="en-CA" dirty="0" smtClean="0"/>
-              <a:t>See link #</a:t>
-            </a:r>
-            <a:r>
-              <a:rPr lang="en-CA" dirty="0" smtClean="0"/>
-              <a:t>4 at the end of these slides</a:t>
-            </a:r>
-            <a:endParaRPr lang="en-CA" dirty="0"/>
+          <p:cNvPr id="9" name="Oval 8"/>
+          <p:cNvSpPr/>
+          <p:nvPr/>
+        </p:nvSpPr>
+        <p:spPr>
+          <a:xfrm>
+            <a:off x="414337" y="5378993"/>
+            <a:ext cx="614863" cy="614863"/>
+          </a:xfrm>
+          <a:prstGeom prst="ellipse">
+            <a:avLst/>
+          </a:prstGeom>
+        </p:spPr>
+        <p:style>
+          <a:lnRef idx="2">
+            <a:schemeClr val="accent1">
+              <a:shade val="50000"/>
+            </a:schemeClr>
+          </a:lnRef>
+          <a:fillRef idx="1">
+            <a:schemeClr val="accent1"/>
+          </a:fillRef>
+          <a:effectRef idx="0">
+            <a:schemeClr val="accent1"/>
+          </a:effectRef>
+          <a:fontRef idx="minor">
+            <a:schemeClr val="lt1"/>
+          </a:fontRef>
+        </p:style>
+        <p:txBody>
+          <a:bodyPr rtlCol="0" anchor="ctr"/>
+          <a:lstStyle/>
+          <a:p>
+            <a:pPr algn="ctr"/>
+            <a:r>
+              <a:rPr lang="en-CA" dirty="0" smtClean="0">
+                <a:ln w="0"/>
+                <a:solidFill>
+                  <a:schemeClr val="bg1"/>
+                </a:solidFill>
+                <a:effectLst>
+                  <a:outerShdw blurRad="38100" dist="19050" dir="2700000" algn="tl" rotWithShape="0">
+                    <a:schemeClr val="dk1">
+                      <a:alpha val="40000"/>
+                    </a:schemeClr>
+                  </a:outerShdw>
+                </a:effectLst>
+                <a:latin typeface="Arial Black" panose="020B0A04020102020204" pitchFamily="34" charset="0"/>
+              </a:rPr>
+              <a:t>3</a:t>
+            </a:r>
+            <a:endParaRPr lang="en-CA" dirty="0">
+              <a:ln w="0"/>
+              <a:solidFill>
+                <a:schemeClr val="bg1"/>
+              </a:solidFill>
+              <a:effectLst>
+                <a:outerShdw blurRad="38100" dist="19050" dir="2700000" algn="tl" rotWithShape="0">
+                  <a:schemeClr val="dk1">
+                    <a:alpha val="40000"/>
+                  </a:schemeClr>
+                </a:outerShdw>
+              </a:effectLst>
+              <a:latin typeface="Arial Black" panose="020B0A04020102020204" pitchFamily="34" charset="0"/>
+            </a:endParaRPr>
           </a:p>
         </p:txBody>
       </p:sp>
     </p:spTree>
     <p:extLst>
       <p:ext uri="{BB962C8B-B14F-4D97-AF65-F5344CB8AC3E}">
-        <p14:creationId xmlns:p14="http://schemas.microsoft.com/office/powerpoint/2010/main" val="4076367433"/>
+        <p14:creationId xmlns:p14="http://schemas.microsoft.com/office/powerpoint/2010/main" val="738207508"/>
       </p:ext>
     </p:extLst>
   </p:cSld>
@@ -13578,7 +15153,7 @@
 </p:sld>
 </file>
 
-<file path=ppt/slides/slide8.xml><?xml version="1.0" encoding="utf-8"?>
+<file path=ppt/slides/slide9.xml><?xml version="1.0" encoding="utf-8"?>
 <p:sld xmlns:a="http://schemas.openxmlformats.org/drawingml/2006/main" xmlns:r="http://schemas.openxmlformats.org/officeDocument/2006/relationships" xmlns:p="http://schemas.openxmlformats.org/presentationml/2006/main">
   <p:cSld>
     <p:spTree>
@@ -13975,90 +15550,6 @@
     <p:extLst>
       <p:ext uri="{BB962C8B-B14F-4D97-AF65-F5344CB8AC3E}">
         <p14:creationId xmlns:p14="http://schemas.microsoft.com/office/powerpoint/2010/main" val="1562895204"/>
-      </p:ext>
-    </p:extLst>
-  </p:cSld>
-  <p:clrMapOvr>
-    <a:masterClrMapping/>
-  </p:clrMapOvr>
-  <p:timing>
-    <p:tnLst>
-      <p:par>
-        <p:cTn id="1" dur="indefinite" restart="never" nodeType="tmRoot"/>
-      </p:par>
-    </p:tnLst>
-  </p:timing>
-</p:sld>
-</file>
-
-<file path=ppt/slides/slide9.xml><?xml version="1.0" encoding="utf-8"?>
-<p:sld xmlns:a="http://schemas.openxmlformats.org/drawingml/2006/main" xmlns:r="http://schemas.openxmlformats.org/officeDocument/2006/relationships" xmlns:p="http://schemas.openxmlformats.org/presentationml/2006/main">
-  <p:cSld>
-    <p:spTree>
-      <p:nvGrpSpPr>
-        <p:cNvPr id="1" name=""/>
-        <p:cNvGrpSpPr/>
-        <p:nvPr/>
-      </p:nvGrpSpPr>
-      <p:grpSpPr>
-        <a:xfrm>
-          <a:off x="0" y="0"/>
-          <a:ext cx="0" cy="0"/>
-          <a:chOff x="0" y="0"/>
-          <a:chExt cx="0" cy="0"/>
-        </a:xfrm>
-      </p:grpSpPr>
-      <p:sp>
-        <p:nvSpPr>
-          <p:cNvPr id="2" name="Title 1"/>
-          <p:cNvSpPr>
-            <a:spLocks noGrp="1"/>
-          </p:cNvSpPr>
-          <p:nvPr>
-            <p:ph type="title"/>
-          </p:nvPr>
-        </p:nvSpPr>
-        <p:spPr/>
-        <p:txBody>
-          <a:bodyPr/>
-          <a:lstStyle/>
-          <a:p>
-            <a:r>
-              <a:rPr lang="en-US" dirty="0" smtClean="0"/>
-              <a:t>Cloning a repo from the net</a:t>
-            </a:r>
-            <a:endParaRPr lang="en-US" dirty="0"/>
-          </a:p>
-        </p:txBody>
-      </p:sp>
-      <p:pic>
-        <p:nvPicPr>
-          <p:cNvPr id="5" name="Picture 4"/>
-          <p:cNvPicPr>
-            <a:picLocks noChangeAspect="1"/>
-          </p:cNvPicPr>
-          <p:nvPr/>
-        </p:nvPicPr>
-        <p:blipFill>
-          <a:blip r:embed="rId3"/>
-          <a:stretch>
-            <a:fillRect/>
-          </a:stretch>
-        </p:blipFill>
-        <p:spPr>
-          <a:xfrm>
-            <a:off x="838200" y="1811597"/>
-            <a:ext cx="10170523" cy="2159901"/>
-          </a:xfrm>
-          <a:prstGeom prst="rect">
-            <a:avLst/>
-          </a:prstGeom>
-        </p:spPr>
-      </p:pic>
-    </p:spTree>
-    <p:extLst>
-      <p:ext uri="{BB962C8B-B14F-4D97-AF65-F5344CB8AC3E}">
-        <p14:creationId xmlns:p14="http://schemas.microsoft.com/office/powerpoint/2010/main" val="2070679325"/>
       </p:ext>
     </p:extLst>
   </p:cSld>

</xml_diff>